<commit_message>
Presentation and research paper for OCE 673 class project.
</commit_message>
<xml_diff>
--- a/studies/florida_straits/Reilly WaveQ3D vs shallow water experimental data.pptx
+++ b/studies/florida_straits/Reilly WaveQ3D vs shallow water experimental data.pptx
@@ -5,7 +5,7 @@
     <p:sldMasterId id="2147483696" r:id="rId1"/>
   </p:sldMasterIdLst>
   <p:notesMasterIdLst>
-    <p:notesMasterId r:id="rId9"/>
+    <p:notesMasterId r:id="rId11"/>
   </p:notesMasterIdLst>
   <p:sldIdLst>
     <p:sldId id="256" r:id="rId2"/>
@@ -15,6 +15,8 @@
     <p:sldId id="262" r:id="rId6"/>
     <p:sldId id="259" r:id="rId7"/>
     <p:sldId id="260" r:id="rId8"/>
+    <p:sldId id="263" r:id="rId9"/>
+    <p:sldId id="264" r:id="rId10"/>
   </p:sldIdLst>
   <p:sldSz cx="9144000" cy="6858000" type="screen4x3"/>
   <p:notesSz cx="6858000" cy="9144000"/>
@@ -4947,6 +4949,13 @@
   <p:clrMapOvr>
     <a:masterClrMapping/>
   </p:clrMapOvr>
+  <p:timing>
+    <p:tnLst>
+      <p:par>
+        <p:cTn id="1" dur="indefinite" restart="never" nodeType="tmRoot"/>
+      </p:par>
+    </p:tnLst>
+  </p:timing>
 </p:sld>
 </file>
 
@@ -5827,6 +5836,110 @@
           </a:prstGeom>
         </p:spPr>
       </p:pic>
+      <p:sp>
+        <p:nvSpPr>
+          <p:cNvPr id="3" name="TextBox 2"/>
+          <p:cNvSpPr txBox="1"/>
+          <p:nvPr/>
+        </p:nvSpPr>
+        <p:spPr>
+          <a:xfrm rot="17178413">
+            <a:off x="744185" y="3973053"/>
+            <a:ext cx="1784719" cy="369332"/>
+          </a:xfrm>
+          <a:prstGeom prst="rect">
+            <a:avLst/>
+          </a:prstGeom>
+          <a:noFill/>
+        </p:spPr>
+        <p:txBody>
+          <a:bodyPr wrap="none" rtlCol="0">
+            <a:spAutoFit/>
+          </a:bodyPr>
+          <a:lstStyle/>
+          <a:p>
+            <a:r>
+              <a:rPr lang="en-US" dirty="0" smtClean="0"/>
+              <a:t>carbonate sands</a:t>
+            </a:r>
+            <a:endParaRPr lang="en-US" dirty="0"/>
+          </a:p>
+        </p:txBody>
+      </p:sp>
+      <p:sp>
+        <p:nvSpPr>
+          <p:cNvPr id="9" name="TextBox 8"/>
+          <p:cNvSpPr txBox="1"/>
+          <p:nvPr/>
+        </p:nvSpPr>
+        <p:spPr>
+          <a:xfrm rot="17049894">
+            <a:off x="1939753" y="4120634"/>
+            <a:ext cx="1167114" cy="369332"/>
+          </a:xfrm>
+          <a:prstGeom prst="rect">
+            <a:avLst/>
+          </a:prstGeom>
+          <a:noFill/>
+        </p:spPr>
+        <p:txBody>
+          <a:bodyPr wrap="none" rtlCol="0">
+            <a:spAutoFit/>
+          </a:bodyPr>
+          <a:lstStyle/>
+          <a:p>
+            <a:r>
+              <a:rPr lang="en-US" dirty="0" smtClean="0">
+                <a:solidFill>
+                  <a:schemeClr val="bg1"/>
+                </a:solidFill>
+              </a:rPr>
+              <a:t>limestone</a:t>
+            </a:r>
+            <a:endParaRPr lang="en-US" dirty="0">
+              <a:solidFill>
+                <a:schemeClr val="bg1"/>
+              </a:solidFill>
+            </a:endParaRPr>
+          </a:p>
+        </p:txBody>
+      </p:sp>
+      <p:sp>
+        <p:nvSpPr>
+          <p:cNvPr id="7" name="TextBox 6"/>
+          <p:cNvSpPr txBox="1"/>
+          <p:nvPr/>
+        </p:nvSpPr>
+        <p:spPr>
+          <a:xfrm>
+            <a:off x="5334000" y="3429000"/>
+            <a:ext cx="824072" cy="646331"/>
+          </a:xfrm>
+          <a:prstGeom prst="rect">
+            <a:avLst/>
+          </a:prstGeom>
+          <a:noFill/>
+        </p:spPr>
+        <p:txBody>
+          <a:bodyPr wrap="none" rtlCol="0">
+            <a:spAutoFit/>
+          </a:bodyPr>
+          <a:lstStyle/>
+          <a:p>
+            <a:r>
+              <a:rPr lang="en-US" dirty="0" smtClean="0"/>
+              <a:t>screen</a:t>
+            </a:r>
+          </a:p>
+          <a:p>
+            <a:r>
+              <a:rPr lang="en-US" dirty="0" smtClean="0"/>
+              <a:t>scrape</a:t>
+            </a:r>
+            <a:endParaRPr lang="en-US" dirty="0"/>
+          </a:p>
+        </p:txBody>
+      </p:sp>
     </p:spTree>
     <p:extLst>
       <p:ext uri="{BB962C8B-B14F-4D97-AF65-F5344CB8AC3E}">
@@ -6116,6 +6229,13 @@
   <p:clrMapOvr>
     <a:masterClrMapping/>
   </p:clrMapOvr>
+  <p:timing>
+    <p:tnLst>
+      <p:par>
+        <p:cTn id="1" dur="indefinite" restart="never" nodeType="tmRoot"/>
+      </p:par>
+    </p:tnLst>
+  </p:timing>
 </p:sld>
 </file>
 
@@ -6185,11 +6305,7 @@
           <a:p>
             <a:r>
               <a:rPr lang="en-US" dirty="0" smtClean="0"/>
-              <a:t>WaveQ3D </a:t>
-            </a:r>
-            <a:r>
-              <a:rPr lang="en-US" dirty="0" smtClean="0"/>
-              <a:t>Modeled Ray Paths</a:t>
+              <a:t>WaveQ3D Modeled Ray Paths</a:t>
             </a:r>
             <a:endParaRPr lang="en-US" dirty="0"/>
           </a:p>
@@ -6391,7 +6507,7 @@
 </file>
 
 <file path=ppt/slides/slide7.xml><?xml version="1.0" encoding="utf-8"?>
-<p:sld xmlns:a="http://schemas.openxmlformats.org/drawingml/2006/main" xmlns:r="http://schemas.openxmlformats.org/officeDocument/2006/relationships" xmlns:p="http://schemas.openxmlformats.org/presentationml/2006/main">
+<p:sld xmlns:a="http://schemas.openxmlformats.org/drawingml/2006/main" xmlns:r="http://schemas.openxmlformats.org/officeDocument/2006/relationships" xmlns:p="http://schemas.openxmlformats.org/presentationml/2006/main" show="0">
   <p:cSld>
     <p:spTree>
       <p:nvGrpSpPr>
@@ -6778,6 +6894,2683 @@
   <p:clrMapOvr>
     <a:masterClrMapping/>
   </p:clrMapOvr>
+  <mc:AlternateContent xmlns:mc="http://schemas.openxmlformats.org/markup-compatibility/2006">
+    <mc:Choice xmlns:p14="http://schemas.microsoft.com/office/powerpoint/2010/main" Requires="p14">
+      <p:transition spd="slow" p14:dur="2000"/>
+    </mc:Choice>
+    <mc:Fallback>
+      <p:transition spd="slow"/>
+    </mc:Fallback>
+  </mc:AlternateContent>
+  <p:timing>
+    <p:tnLst>
+      <p:par>
+        <p:cTn id="1" dur="indefinite" restart="never" nodeType="tmRoot"/>
+      </p:par>
+    </p:tnLst>
+  </p:timing>
+</p:sld>
+</file>
+
+<file path=ppt/slides/slide8.xml><?xml version="1.0" encoding="utf-8"?>
+<p:sld xmlns:a="http://schemas.openxmlformats.org/drawingml/2006/main" xmlns:r="http://schemas.openxmlformats.org/officeDocument/2006/relationships" xmlns:p="http://schemas.openxmlformats.org/presentationml/2006/main">
+  <p:cSld>
+    <p:spTree>
+      <p:nvGrpSpPr>
+        <p:cNvPr id="1" name=""/>
+        <p:cNvGrpSpPr/>
+        <p:nvPr/>
+      </p:nvGrpSpPr>
+      <p:grpSpPr>
+        <a:xfrm>
+          <a:off x="0" y="0"/>
+          <a:ext cx="0" cy="0"/>
+          <a:chOff x="0" y="0"/>
+          <a:chExt cx="0" cy="0"/>
+        </a:xfrm>
+      </p:grpSpPr>
+      <p:sp>
+        <p:nvSpPr>
+          <p:cNvPr id="2" name="Title 1"/>
+          <p:cNvSpPr>
+            <a:spLocks noGrp="1"/>
+          </p:cNvSpPr>
+          <p:nvPr>
+            <p:ph type="title"/>
+          </p:nvPr>
+        </p:nvSpPr>
+        <p:spPr/>
+        <p:txBody>
+          <a:bodyPr/>
+          <a:lstStyle/>
+          <a:p>
+            <a:r>
+              <a:rPr lang="en-US" dirty="0"/>
+              <a:t>WaveQ3D </a:t>
+            </a:r>
+            <a:r>
+              <a:rPr lang="en-US" dirty="0" smtClean="0"/>
+              <a:t>Transmission Loss</a:t>
+            </a:r>
+            <a:endParaRPr lang="en-US" dirty="0"/>
+          </a:p>
+        </p:txBody>
+      </p:sp>
+      <p:sp>
+        <p:nvSpPr>
+          <p:cNvPr id="4" name="Slide Number Placeholder 3"/>
+          <p:cNvSpPr>
+            <a:spLocks noGrp="1"/>
+          </p:cNvSpPr>
+          <p:nvPr>
+            <p:ph type="sldNum" sz="quarter" idx="12"/>
+          </p:nvPr>
+        </p:nvSpPr>
+        <p:spPr/>
+        <p:txBody>
+          <a:bodyPr/>
+          <a:lstStyle/>
+          <a:p>
+            <a:fld id="{719B5E6B-B750-449F-A404-1846F1BF9B87}" type="slidenum">
+              <a:rPr lang="en-US" smtClean="0"/>
+              <a:pPr/>
+              <a:t>8</a:t>
+            </a:fld>
+            <a:endParaRPr lang="en-US" dirty="0"/>
+          </a:p>
+        </p:txBody>
+      </p:sp>
+      <p:pic>
+        <p:nvPicPr>
+          <p:cNvPr id="1026" name="Picture 2"/>
+          <p:cNvPicPr>
+            <a:picLocks noChangeAspect="1" noChangeArrowheads="1"/>
+          </p:cNvPicPr>
+          <p:nvPr/>
+        </p:nvPicPr>
+        <p:blipFill>
+          <a:blip r:embed="rId2">
+            <a:extLst>
+              <a:ext uri="{28A0092B-C50C-407E-A947-70E740481C1C}">
+                <a14:useLocalDpi xmlns:a14="http://schemas.microsoft.com/office/drawing/2010/main" val="0"/>
+              </a:ext>
+            </a:extLst>
+          </a:blip>
+          <a:srcRect/>
+          <a:stretch>
+            <a:fillRect/>
+          </a:stretch>
+        </p:blipFill>
+        <p:spPr bwMode="auto">
+          <a:xfrm>
+            <a:off x="1447800" y="1981200"/>
+            <a:ext cx="5781675" cy="4543425"/>
+          </a:xfrm>
+          <a:prstGeom prst="rect">
+            <a:avLst/>
+          </a:prstGeom>
+          <a:noFill/>
+          <a:ln>
+            <a:noFill/>
+          </a:ln>
+          <a:effectLst/>
+          <a:extLst>
+            <a:ext uri="{909E8E84-426E-40DD-AFC4-6F175D3DCCD1}">
+              <a14:hiddenFill xmlns:a14="http://schemas.microsoft.com/office/drawing/2010/main">
+                <a:solidFill>
+                  <a:schemeClr val="accent1"/>
+                </a:solidFill>
+              </a14:hiddenFill>
+            </a:ext>
+            <a:ext uri="{91240B29-F687-4F45-9708-019B960494DF}">
+              <a14:hiddenLine xmlns:a14="http://schemas.microsoft.com/office/drawing/2010/main" w="9525">
+                <a:solidFill>
+                  <a:schemeClr val="tx1"/>
+                </a:solidFill>
+                <a:miter lim="800000"/>
+                <a:headEnd/>
+                <a:tailEnd/>
+              </a14:hiddenLine>
+            </a:ext>
+            <a:ext uri="{AF507438-7753-43E0-B8FC-AC1667EBCBE1}">
+              <a14:hiddenEffects xmlns:a14="http://schemas.microsoft.com/office/drawing/2010/main">
+                <a:effectLst>
+                  <a:outerShdw dist="35921" dir="2700000" algn="ctr" rotWithShape="0">
+                    <a:schemeClr val="bg2"/>
+                  </a:outerShdw>
+                </a:effectLst>
+              </a14:hiddenEffects>
+            </a:ext>
+          </a:extLst>
+        </p:spPr>
+      </p:pic>
+      <p:sp>
+        <p:nvSpPr>
+          <p:cNvPr id="65" name="Rectangle 7"/>
+          <p:cNvSpPr>
+            <a:spLocks noChangeArrowheads="1"/>
+          </p:cNvSpPr>
+          <p:nvPr/>
+        </p:nvSpPr>
+        <p:spPr bwMode="auto">
+          <a:xfrm>
+            <a:off x="2033587" y="2324100"/>
+            <a:ext cx="4824413" cy="1580988"/>
+          </a:xfrm>
+          <a:prstGeom prst="rect">
+            <a:avLst/>
+          </a:prstGeom>
+          <a:noFill/>
+          <a:ln w="0">
+            <a:solidFill>
+              <a:srgbClr val="FFFFFF"/>
+            </a:solidFill>
+            <a:prstDash val="solid"/>
+            <a:miter lim="800000"/>
+            <a:headEnd/>
+            <a:tailEnd/>
+          </a:ln>
+          <a:extLst>
+            <a:ext uri="{909E8E84-426E-40DD-AFC4-6F175D3DCCD1}">
+              <a14:hiddenFill xmlns:a14="http://schemas.microsoft.com/office/drawing/2010/main">
+                <a:solidFill>
+                  <a:srgbClr val="FFFFFF"/>
+                </a:solidFill>
+              </a14:hiddenFill>
+            </a:ext>
+          </a:extLst>
+        </p:spPr>
+        <p:txBody>
+          <a:bodyPr vert="horz" wrap="square" lIns="91440" tIns="45720" rIns="91440" bIns="45720" numCol="1" anchor="t" anchorCtr="0" compatLnSpc="1">
+            <a:prstTxWarp prst="textNoShape">
+              <a:avLst/>
+            </a:prstTxWarp>
+          </a:bodyPr>
+          <a:lstStyle/>
+          <a:p>
+            <a:endParaRPr lang="en-US"/>
+          </a:p>
+        </p:txBody>
+      </p:sp>
+      <p:sp>
+        <p:nvSpPr>
+          <p:cNvPr id="66" name="Line 8"/>
+          <p:cNvSpPr>
+            <a:spLocks noChangeShapeType="1"/>
+          </p:cNvSpPr>
+          <p:nvPr/>
+        </p:nvSpPr>
+        <p:spPr bwMode="auto">
+          <a:xfrm>
+            <a:off x="2033587" y="2324100"/>
+            <a:ext cx="4824413" cy="0"/>
+          </a:xfrm>
+          <a:prstGeom prst="line">
+            <a:avLst/>
+          </a:prstGeom>
+          <a:noFill/>
+          <a:ln w="0">
+            <a:solidFill>
+              <a:srgbClr val="000000"/>
+            </a:solidFill>
+            <a:prstDash val="solid"/>
+            <a:round/>
+            <a:headEnd/>
+            <a:tailEnd/>
+          </a:ln>
+          <a:extLst>
+            <a:ext uri="{909E8E84-426E-40DD-AFC4-6F175D3DCCD1}">
+              <a14:hiddenFill xmlns:a14="http://schemas.microsoft.com/office/drawing/2010/main">
+                <a:noFill/>
+              </a14:hiddenFill>
+            </a:ext>
+          </a:extLst>
+        </p:spPr>
+        <p:txBody>
+          <a:bodyPr vert="horz" wrap="square" lIns="91440" tIns="45720" rIns="91440" bIns="45720" numCol="1" anchor="t" anchorCtr="0" compatLnSpc="1">
+            <a:prstTxWarp prst="textNoShape">
+              <a:avLst/>
+            </a:prstTxWarp>
+          </a:bodyPr>
+          <a:lstStyle/>
+          <a:p>
+            <a:endParaRPr lang="en-US"/>
+          </a:p>
+        </p:txBody>
+      </p:sp>
+      <p:sp>
+        <p:nvSpPr>
+          <p:cNvPr id="67" name="Line 9"/>
+          <p:cNvSpPr>
+            <a:spLocks noChangeShapeType="1"/>
+          </p:cNvSpPr>
+          <p:nvPr/>
+        </p:nvSpPr>
+        <p:spPr bwMode="auto">
+          <a:xfrm>
+            <a:off x="2033587" y="3905088"/>
+            <a:ext cx="4824413" cy="0"/>
+          </a:xfrm>
+          <a:prstGeom prst="line">
+            <a:avLst/>
+          </a:prstGeom>
+          <a:noFill/>
+          <a:ln w="0">
+            <a:solidFill>
+              <a:srgbClr val="000000"/>
+            </a:solidFill>
+            <a:prstDash val="solid"/>
+            <a:round/>
+            <a:headEnd/>
+            <a:tailEnd/>
+          </a:ln>
+          <a:extLst>
+            <a:ext uri="{909E8E84-426E-40DD-AFC4-6F175D3DCCD1}">
+              <a14:hiddenFill xmlns:a14="http://schemas.microsoft.com/office/drawing/2010/main">
+                <a:noFill/>
+              </a14:hiddenFill>
+            </a:ext>
+          </a:extLst>
+        </p:spPr>
+        <p:txBody>
+          <a:bodyPr vert="horz" wrap="square" lIns="91440" tIns="45720" rIns="91440" bIns="45720" numCol="1" anchor="t" anchorCtr="0" compatLnSpc="1">
+            <a:prstTxWarp prst="textNoShape">
+              <a:avLst/>
+            </a:prstTxWarp>
+          </a:bodyPr>
+          <a:lstStyle/>
+          <a:p>
+            <a:endParaRPr lang="en-US"/>
+          </a:p>
+        </p:txBody>
+      </p:sp>
+      <p:sp>
+        <p:nvSpPr>
+          <p:cNvPr id="68" name="Line 10"/>
+          <p:cNvSpPr>
+            <a:spLocks noChangeShapeType="1"/>
+          </p:cNvSpPr>
+          <p:nvPr/>
+        </p:nvSpPr>
+        <p:spPr bwMode="auto">
+          <a:xfrm flipV="1">
+            <a:off x="6858000" y="2324100"/>
+            <a:ext cx="0" cy="1580988"/>
+          </a:xfrm>
+          <a:prstGeom prst="line">
+            <a:avLst/>
+          </a:prstGeom>
+          <a:noFill/>
+          <a:ln w="0">
+            <a:solidFill>
+              <a:srgbClr val="000000"/>
+            </a:solidFill>
+            <a:prstDash val="solid"/>
+            <a:round/>
+            <a:headEnd/>
+            <a:tailEnd/>
+          </a:ln>
+          <a:extLst>
+            <a:ext uri="{909E8E84-426E-40DD-AFC4-6F175D3DCCD1}">
+              <a14:hiddenFill xmlns:a14="http://schemas.microsoft.com/office/drawing/2010/main">
+                <a:noFill/>
+              </a14:hiddenFill>
+            </a:ext>
+          </a:extLst>
+        </p:spPr>
+        <p:txBody>
+          <a:bodyPr vert="horz" wrap="square" lIns="91440" tIns="45720" rIns="91440" bIns="45720" numCol="1" anchor="t" anchorCtr="0" compatLnSpc="1">
+            <a:prstTxWarp prst="textNoShape">
+              <a:avLst/>
+            </a:prstTxWarp>
+          </a:bodyPr>
+          <a:lstStyle/>
+          <a:p>
+            <a:endParaRPr lang="en-US"/>
+          </a:p>
+        </p:txBody>
+      </p:sp>
+      <p:sp>
+        <p:nvSpPr>
+          <p:cNvPr id="69" name="Line 11"/>
+          <p:cNvSpPr>
+            <a:spLocks noChangeShapeType="1"/>
+          </p:cNvSpPr>
+          <p:nvPr/>
+        </p:nvSpPr>
+        <p:spPr bwMode="auto">
+          <a:xfrm flipV="1">
+            <a:off x="2033587" y="2324100"/>
+            <a:ext cx="0" cy="1580988"/>
+          </a:xfrm>
+          <a:prstGeom prst="line">
+            <a:avLst/>
+          </a:prstGeom>
+          <a:noFill/>
+          <a:ln w="0">
+            <a:solidFill>
+              <a:srgbClr val="000000"/>
+            </a:solidFill>
+            <a:prstDash val="solid"/>
+            <a:round/>
+            <a:headEnd/>
+            <a:tailEnd/>
+          </a:ln>
+          <a:extLst>
+            <a:ext uri="{909E8E84-426E-40DD-AFC4-6F175D3DCCD1}">
+              <a14:hiddenFill xmlns:a14="http://schemas.microsoft.com/office/drawing/2010/main">
+                <a:noFill/>
+              </a14:hiddenFill>
+            </a:ext>
+          </a:extLst>
+        </p:spPr>
+        <p:txBody>
+          <a:bodyPr vert="horz" wrap="square" lIns="91440" tIns="45720" rIns="91440" bIns="45720" numCol="1" anchor="t" anchorCtr="0" compatLnSpc="1">
+            <a:prstTxWarp prst="textNoShape">
+              <a:avLst/>
+            </a:prstTxWarp>
+          </a:bodyPr>
+          <a:lstStyle/>
+          <a:p>
+            <a:endParaRPr lang="en-US"/>
+          </a:p>
+        </p:txBody>
+      </p:sp>
+      <p:sp>
+        <p:nvSpPr>
+          <p:cNvPr id="70" name="Line 12"/>
+          <p:cNvSpPr>
+            <a:spLocks noChangeShapeType="1"/>
+          </p:cNvSpPr>
+          <p:nvPr/>
+        </p:nvSpPr>
+        <p:spPr bwMode="auto">
+          <a:xfrm>
+            <a:off x="2033587" y="3905088"/>
+            <a:ext cx="4824413" cy="0"/>
+          </a:xfrm>
+          <a:prstGeom prst="line">
+            <a:avLst/>
+          </a:prstGeom>
+          <a:noFill/>
+          <a:ln w="0">
+            <a:solidFill>
+              <a:srgbClr val="000000"/>
+            </a:solidFill>
+            <a:prstDash val="solid"/>
+            <a:round/>
+            <a:headEnd/>
+            <a:tailEnd/>
+          </a:ln>
+          <a:extLst>
+            <a:ext uri="{909E8E84-426E-40DD-AFC4-6F175D3DCCD1}">
+              <a14:hiddenFill xmlns:a14="http://schemas.microsoft.com/office/drawing/2010/main">
+                <a:noFill/>
+              </a14:hiddenFill>
+            </a:ext>
+          </a:extLst>
+        </p:spPr>
+        <p:txBody>
+          <a:bodyPr vert="horz" wrap="square" lIns="91440" tIns="45720" rIns="91440" bIns="45720" numCol="1" anchor="t" anchorCtr="0" compatLnSpc="1">
+            <a:prstTxWarp prst="textNoShape">
+              <a:avLst/>
+            </a:prstTxWarp>
+          </a:bodyPr>
+          <a:lstStyle/>
+          <a:p>
+            <a:endParaRPr lang="en-US"/>
+          </a:p>
+        </p:txBody>
+      </p:sp>
+      <p:sp>
+        <p:nvSpPr>
+          <p:cNvPr id="71" name="Line 13"/>
+          <p:cNvSpPr>
+            <a:spLocks noChangeShapeType="1"/>
+          </p:cNvSpPr>
+          <p:nvPr/>
+        </p:nvSpPr>
+        <p:spPr bwMode="auto">
+          <a:xfrm flipV="1">
+            <a:off x="2033587" y="2324100"/>
+            <a:ext cx="0" cy="1580988"/>
+          </a:xfrm>
+          <a:prstGeom prst="line">
+            <a:avLst/>
+          </a:prstGeom>
+          <a:noFill/>
+          <a:ln w="0">
+            <a:solidFill>
+              <a:srgbClr val="000000"/>
+            </a:solidFill>
+            <a:prstDash val="solid"/>
+            <a:round/>
+            <a:headEnd/>
+            <a:tailEnd/>
+          </a:ln>
+          <a:extLst>
+            <a:ext uri="{909E8E84-426E-40DD-AFC4-6F175D3DCCD1}">
+              <a14:hiddenFill xmlns:a14="http://schemas.microsoft.com/office/drawing/2010/main">
+                <a:noFill/>
+              </a14:hiddenFill>
+            </a:ext>
+          </a:extLst>
+        </p:spPr>
+        <p:txBody>
+          <a:bodyPr vert="horz" wrap="square" lIns="91440" tIns="45720" rIns="91440" bIns="45720" numCol="1" anchor="t" anchorCtr="0" compatLnSpc="1">
+            <a:prstTxWarp prst="textNoShape">
+              <a:avLst/>
+            </a:prstTxWarp>
+          </a:bodyPr>
+          <a:lstStyle/>
+          <a:p>
+            <a:endParaRPr lang="en-US"/>
+          </a:p>
+        </p:txBody>
+      </p:sp>
+      <p:sp>
+        <p:nvSpPr>
+          <p:cNvPr id="72" name="Line 14"/>
+          <p:cNvSpPr>
+            <a:spLocks noChangeShapeType="1"/>
+          </p:cNvSpPr>
+          <p:nvPr/>
+        </p:nvSpPr>
+        <p:spPr bwMode="auto">
+          <a:xfrm>
+            <a:off x="2033587" y="2324100"/>
+            <a:ext cx="4824413" cy="0"/>
+          </a:xfrm>
+          <a:prstGeom prst="line">
+            <a:avLst/>
+          </a:prstGeom>
+          <a:noFill/>
+          <a:ln w="0">
+            <a:solidFill>
+              <a:srgbClr val="000000"/>
+            </a:solidFill>
+            <a:prstDash val="solid"/>
+            <a:round/>
+            <a:headEnd/>
+            <a:tailEnd/>
+          </a:ln>
+          <a:extLst>
+            <a:ext uri="{909E8E84-426E-40DD-AFC4-6F175D3DCCD1}">
+              <a14:hiddenFill xmlns:a14="http://schemas.microsoft.com/office/drawing/2010/main">
+                <a:noFill/>
+              </a14:hiddenFill>
+            </a:ext>
+          </a:extLst>
+        </p:spPr>
+        <p:txBody>
+          <a:bodyPr vert="horz" wrap="square" lIns="91440" tIns="45720" rIns="91440" bIns="45720" numCol="1" anchor="t" anchorCtr="0" compatLnSpc="1">
+            <a:prstTxWarp prst="textNoShape">
+              <a:avLst/>
+            </a:prstTxWarp>
+          </a:bodyPr>
+          <a:lstStyle/>
+          <a:p>
+            <a:endParaRPr lang="en-US"/>
+          </a:p>
+        </p:txBody>
+      </p:sp>
+      <p:sp>
+        <p:nvSpPr>
+          <p:cNvPr id="73" name="Line 15"/>
+          <p:cNvSpPr>
+            <a:spLocks noChangeShapeType="1"/>
+          </p:cNvSpPr>
+          <p:nvPr/>
+        </p:nvSpPr>
+        <p:spPr bwMode="auto">
+          <a:xfrm>
+            <a:off x="2033587" y="3905088"/>
+            <a:ext cx="4824413" cy="0"/>
+          </a:xfrm>
+          <a:prstGeom prst="line">
+            <a:avLst/>
+          </a:prstGeom>
+          <a:noFill/>
+          <a:ln w="0">
+            <a:solidFill>
+              <a:srgbClr val="000000"/>
+            </a:solidFill>
+            <a:prstDash val="solid"/>
+            <a:round/>
+            <a:headEnd/>
+            <a:tailEnd/>
+          </a:ln>
+          <a:extLst>
+            <a:ext uri="{909E8E84-426E-40DD-AFC4-6F175D3DCCD1}">
+              <a14:hiddenFill xmlns:a14="http://schemas.microsoft.com/office/drawing/2010/main">
+                <a:noFill/>
+              </a14:hiddenFill>
+            </a:ext>
+          </a:extLst>
+        </p:spPr>
+        <p:txBody>
+          <a:bodyPr vert="horz" wrap="square" lIns="91440" tIns="45720" rIns="91440" bIns="45720" numCol="1" anchor="t" anchorCtr="0" compatLnSpc="1">
+            <a:prstTxWarp prst="textNoShape">
+              <a:avLst/>
+            </a:prstTxWarp>
+          </a:bodyPr>
+          <a:lstStyle/>
+          <a:p>
+            <a:endParaRPr lang="en-US"/>
+          </a:p>
+        </p:txBody>
+      </p:sp>
+      <p:sp>
+        <p:nvSpPr>
+          <p:cNvPr id="74" name="Line 16"/>
+          <p:cNvSpPr>
+            <a:spLocks noChangeShapeType="1"/>
+          </p:cNvSpPr>
+          <p:nvPr/>
+        </p:nvSpPr>
+        <p:spPr bwMode="auto">
+          <a:xfrm flipV="1">
+            <a:off x="6858000" y="2324100"/>
+            <a:ext cx="0" cy="1580988"/>
+          </a:xfrm>
+          <a:prstGeom prst="line">
+            <a:avLst/>
+          </a:prstGeom>
+          <a:noFill/>
+          <a:ln w="0">
+            <a:solidFill>
+              <a:srgbClr val="000000"/>
+            </a:solidFill>
+            <a:prstDash val="solid"/>
+            <a:round/>
+            <a:headEnd/>
+            <a:tailEnd/>
+          </a:ln>
+          <a:extLst>
+            <a:ext uri="{909E8E84-426E-40DD-AFC4-6F175D3DCCD1}">
+              <a14:hiddenFill xmlns:a14="http://schemas.microsoft.com/office/drawing/2010/main">
+                <a:noFill/>
+              </a14:hiddenFill>
+            </a:ext>
+          </a:extLst>
+        </p:spPr>
+        <p:txBody>
+          <a:bodyPr vert="horz" wrap="square" lIns="91440" tIns="45720" rIns="91440" bIns="45720" numCol="1" anchor="t" anchorCtr="0" compatLnSpc="1">
+            <a:prstTxWarp prst="textNoShape">
+              <a:avLst/>
+            </a:prstTxWarp>
+          </a:bodyPr>
+          <a:lstStyle/>
+          <a:p>
+            <a:endParaRPr lang="en-US"/>
+          </a:p>
+        </p:txBody>
+      </p:sp>
+      <p:sp>
+        <p:nvSpPr>
+          <p:cNvPr id="75" name="Line 17"/>
+          <p:cNvSpPr>
+            <a:spLocks noChangeShapeType="1"/>
+          </p:cNvSpPr>
+          <p:nvPr/>
+        </p:nvSpPr>
+        <p:spPr bwMode="auto">
+          <a:xfrm flipV="1">
+            <a:off x="2033587" y="2324100"/>
+            <a:ext cx="0" cy="1580988"/>
+          </a:xfrm>
+          <a:prstGeom prst="line">
+            <a:avLst/>
+          </a:prstGeom>
+          <a:noFill/>
+          <a:ln w="0">
+            <a:solidFill>
+              <a:srgbClr val="000000"/>
+            </a:solidFill>
+            <a:prstDash val="solid"/>
+            <a:round/>
+            <a:headEnd/>
+            <a:tailEnd/>
+          </a:ln>
+          <a:extLst>
+            <a:ext uri="{909E8E84-426E-40DD-AFC4-6F175D3DCCD1}">
+              <a14:hiddenFill xmlns:a14="http://schemas.microsoft.com/office/drawing/2010/main">
+                <a:noFill/>
+              </a14:hiddenFill>
+            </a:ext>
+          </a:extLst>
+        </p:spPr>
+        <p:txBody>
+          <a:bodyPr vert="horz" wrap="square" lIns="91440" tIns="45720" rIns="91440" bIns="45720" numCol="1" anchor="t" anchorCtr="0" compatLnSpc="1">
+            <a:prstTxWarp prst="textNoShape">
+              <a:avLst/>
+            </a:prstTxWarp>
+          </a:bodyPr>
+          <a:lstStyle/>
+          <a:p>
+            <a:endParaRPr lang="en-US"/>
+          </a:p>
+        </p:txBody>
+      </p:sp>
+      <p:sp>
+        <p:nvSpPr>
+          <p:cNvPr id="76" name="Oval 18"/>
+          <p:cNvSpPr>
+            <a:spLocks noChangeArrowheads="1"/>
+          </p:cNvSpPr>
+          <p:nvPr/>
+        </p:nvSpPr>
+        <p:spPr bwMode="auto">
+          <a:xfrm>
+            <a:off x="2179536" y="2484606"/>
+            <a:ext cx="64866" cy="64203"/>
+          </a:xfrm>
+          <a:prstGeom prst="ellipse">
+            <a:avLst/>
+          </a:prstGeom>
+          <a:solidFill>
+            <a:srgbClr val="FF0000"/>
+          </a:solidFill>
+          <a:ln w="0">
+            <a:solidFill>
+              <a:srgbClr val="FF0000"/>
+            </a:solidFill>
+            <a:prstDash val="solid"/>
+            <a:round/>
+            <a:headEnd/>
+            <a:tailEnd/>
+          </a:ln>
+        </p:spPr>
+        <p:txBody>
+          <a:bodyPr vert="horz" wrap="square" lIns="91440" tIns="45720" rIns="91440" bIns="45720" numCol="1" anchor="t" anchorCtr="0" compatLnSpc="1">
+            <a:prstTxWarp prst="textNoShape">
+              <a:avLst/>
+            </a:prstTxWarp>
+          </a:bodyPr>
+          <a:lstStyle/>
+          <a:p>
+            <a:endParaRPr lang="en-US"/>
+          </a:p>
+        </p:txBody>
+      </p:sp>
+      <p:sp>
+        <p:nvSpPr>
+          <p:cNvPr id="77" name="Oval 19"/>
+          <p:cNvSpPr>
+            <a:spLocks noChangeArrowheads="1"/>
+          </p:cNvSpPr>
+          <p:nvPr/>
+        </p:nvSpPr>
+        <p:spPr bwMode="auto">
+          <a:xfrm>
+            <a:off x="2236293" y="2580910"/>
+            <a:ext cx="64866" cy="64203"/>
+          </a:xfrm>
+          <a:prstGeom prst="ellipse">
+            <a:avLst/>
+          </a:prstGeom>
+          <a:solidFill>
+            <a:srgbClr val="FF0000"/>
+          </a:solidFill>
+          <a:ln w="0">
+            <a:solidFill>
+              <a:srgbClr val="FF0000"/>
+            </a:solidFill>
+            <a:prstDash val="solid"/>
+            <a:round/>
+            <a:headEnd/>
+            <a:tailEnd/>
+          </a:ln>
+        </p:spPr>
+        <p:txBody>
+          <a:bodyPr vert="horz" wrap="square" lIns="91440" tIns="45720" rIns="91440" bIns="45720" numCol="1" anchor="t" anchorCtr="0" compatLnSpc="1">
+            <a:prstTxWarp prst="textNoShape">
+              <a:avLst/>
+            </a:prstTxWarp>
+          </a:bodyPr>
+          <a:lstStyle/>
+          <a:p>
+            <a:endParaRPr lang="en-US"/>
+          </a:p>
+        </p:txBody>
+      </p:sp>
+      <p:sp>
+        <p:nvSpPr>
+          <p:cNvPr id="78" name="Oval 20"/>
+          <p:cNvSpPr>
+            <a:spLocks noChangeArrowheads="1"/>
+          </p:cNvSpPr>
+          <p:nvPr/>
+        </p:nvSpPr>
+        <p:spPr bwMode="auto">
+          <a:xfrm>
+            <a:off x="2301159" y="2468556"/>
+            <a:ext cx="64866" cy="64203"/>
+          </a:xfrm>
+          <a:prstGeom prst="ellipse">
+            <a:avLst/>
+          </a:prstGeom>
+          <a:solidFill>
+            <a:srgbClr val="FF0000"/>
+          </a:solidFill>
+          <a:ln w="0">
+            <a:solidFill>
+              <a:srgbClr val="FF0000"/>
+            </a:solidFill>
+            <a:prstDash val="solid"/>
+            <a:round/>
+            <a:headEnd/>
+            <a:tailEnd/>
+          </a:ln>
+        </p:spPr>
+        <p:txBody>
+          <a:bodyPr vert="horz" wrap="square" lIns="91440" tIns="45720" rIns="91440" bIns="45720" numCol="1" anchor="t" anchorCtr="0" compatLnSpc="1">
+            <a:prstTxWarp prst="textNoShape">
+              <a:avLst/>
+            </a:prstTxWarp>
+          </a:bodyPr>
+          <a:lstStyle/>
+          <a:p>
+            <a:endParaRPr lang="en-US"/>
+          </a:p>
+        </p:txBody>
+      </p:sp>
+      <p:sp>
+        <p:nvSpPr>
+          <p:cNvPr id="79" name="Oval 21"/>
+          <p:cNvSpPr>
+            <a:spLocks noChangeArrowheads="1"/>
+          </p:cNvSpPr>
+          <p:nvPr/>
+        </p:nvSpPr>
+        <p:spPr bwMode="auto">
+          <a:xfrm>
+            <a:off x="2357917" y="2893898"/>
+            <a:ext cx="64866" cy="64203"/>
+          </a:xfrm>
+          <a:prstGeom prst="ellipse">
+            <a:avLst/>
+          </a:prstGeom>
+          <a:solidFill>
+            <a:srgbClr val="FF0000"/>
+          </a:solidFill>
+          <a:ln w="0">
+            <a:solidFill>
+              <a:srgbClr val="FF0000"/>
+            </a:solidFill>
+            <a:prstDash val="solid"/>
+            <a:round/>
+            <a:headEnd/>
+            <a:tailEnd/>
+          </a:ln>
+        </p:spPr>
+        <p:txBody>
+          <a:bodyPr vert="horz" wrap="square" lIns="91440" tIns="45720" rIns="91440" bIns="45720" numCol="1" anchor="t" anchorCtr="0" compatLnSpc="1">
+            <a:prstTxWarp prst="textNoShape">
+              <a:avLst/>
+            </a:prstTxWarp>
+          </a:bodyPr>
+          <a:lstStyle/>
+          <a:p>
+            <a:endParaRPr lang="en-US"/>
+          </a:p>
+        </p:txBody>
+      </p:sp>
+      <p:sp>
+        <p:nvSpPr>
+          <p:cNvPr id="80" name="Oval 22"/>
+          <p:cNvSpPr>
+            <a:spLocks noChangeArrowheads="1"/>
+          </p:cNvSpPr>
+          <p:nvPr/>
+        </p:nvSpPr>
+        <p:spPr bwMode="auto">
+          <a:xfrm>
+            <a:off x="2422783" y="2621037"/>
+            <a:ext cx="64866" cy="64203"/>
+          </a:xfrm>
+          <a:prstGeom prst="ellipse">
+            <a:avLst/>
+          </a:prstGeom>
+          <a:solidFill>
+            <a:srgbClr val="FF0000"/>
+          </a:solidFill>
+          <a:ln w="0">
+            <a:solidFill>
+              <a:srgbClr val="FF0000"/>
+            </a:solidFill>
+            <a:prstDash val="solid"/>
+            <a:round/>
+            <a:headEnd/>
+            <a:tailEnd/>
+          </a:ln>
+        </p:spPr>
+        <p:txBody>
+          <a:bodyPr vert="horz" wrap="square" lIns="91440" tIns="45720" rIns="91440" bIns="45720" numCol="1" anchor="t" anchorCtr="0" compatLnSpc="1">
+            <a:prstTxWarp prst="textNoShape">
+              <a:avLst/>
+            </a:prstTxWarp>
+          </a:bodyPr>
+          <a:lstStyle/>
+          <a:p>
+            <a:endParaRPr lang="en-US"/>
+          </a:p>
+        </p:txBody>
+      </p:sp>
+      <p:sp>
+        <p:nvSpPr>
+          <p:cNvPr id="81" name="Oval 23"/>
+          <p:cNvSpPr>
+            <a:spLocks noChangeArrowheads="1"/>
+          </p:cNvSpPr>
+          <p:nvPr/>
+        </p:nvSpPr>
+        <p:spPr bwMode="auto">
+          <a:xfrm>
+            <a:off x="2479541" y="2629062"/>
+            <a:ext cx="64866" cy="64203"/>
+          </a:xfrm>
+          <a:prstGeom prst="ellipse">
+            <a:avLst/>
+          </a:prstGeom>
+          <a:solidFill>
+            <a:srgbClr val="FF0000"/>
+          </a:solidFill>
+          <a:ln w="0">
+            <a:solidFill>
+              <a:srgbClr val="FF0000"/>
+            </a:solidFill>
+            <a:prstDash val="solid"/>
+            <a:round/>
+            <a:headEnd/>
+            <a:tailEnd/>
+          </a:ln>
+        </p:spPr>
+        <p:txBody>
+          <a:bodyPr vert="horz" wrap="square" lIns="91440" tIns="45720" rIns="91440" bIns="45720" numCol="1" anchor="t" anchorCtr="0" compatLnSpc="1">
+            <a:prstTxWarp prst="textNoShape">
+              <a:avLst/>
+            </a:prstTxWarp>
+          </a:bodyPr>
+          <a:lstStyle/>
+          <a:p>
+            <a:endParaRPr lang="en-US"/>
+          </a:p>
+        </p:txBody>
+      </p:sp>
+      <p:sp>
+        <p:nvSpPr>
+          <p:cNvPr id="82" name="Oval 24"/>
+          <p:cNvSpPr>
+            <a:spLocks noChangeArrowheads="1"/>
+          </p:cNvSpPr>
+          <p:nvPr/>
+        </p:nvSpPr>
+        <p:spPr bwMode="auto">
+          <a:xfrm>
+            <a:off x="2536299" y="3046379"/>
+            <a:ext cx="64866" cy="64203"/>
+          </a:xfrm>
+          <a:prstGeom prst="ellipse">
+            <a:avLst/>
+          </a:prstGeom>
+          <a:solidFill>
+            <a:srgbClr val="FF0000"/>
+          </a:solidFill>
+          <a:ln w="0">
+            <a:solidFill>
+              <a:srgbClr val="FF0000"/>
+            </a:solidFill>
+            <a:prstDash val="solid"/>
+            <a:round/>
+            <a:headEnd/>
+            <a:tailEnd/>
+          </a:ln>
+        </p:spPr>
+        <p:txBody>
+          <a:bodyPr vert="horz" wrap="square" lIns="91440" tIns="45720" rIns="91440" bIns="45720" numCol="1" anchor="t" anchorCtr="0" compatLnSpc="1">
+            <a:prstTxWarp prst="textNoShape">
+              <a:avLst/>
+            </a:prstTxWarp>
+          </a:bodyPr>
+          <a:lstStyle/>
+          <a:p>
+            <a:endParaRPr lang="en-US"/>
+          </a:p>
+        </p:txBody>
+      </p:sp>
+      <p:sp>
+        <p:nvSpPr>
+          <p:cNvPr id="83" name="Oval 25"/>
+          <p:cNvSpPr>
+            <a:spLocks noChangeArrowheads="1"/>
+          </p:cNvSpPr>
+          <p:nvPr/>
+        </p:nvSpPr>
+        <p:spPr bwMode="auto">
+          <a:xfrm>
+            <a:off x="2601165" y="2845746"/>
+            <a:ext cx="64866" cy="64203"/>
+          </a:xfrm>
+          <a:prstGeom prst="ellipse">
+            <a:avLst/>
+          </a:prstGeom>
+          <a:solidFill>
+            <a:srgbClr val="FF0000"/>
+          </a:solidFill>
+          <a:ln w="0">
+            <a:solidFill>
+              <a:srgbClr val="FF0000"/>
+            </a:solidFill>
+            <a:prstDash val="solid"/>
+            <a:round/>
+            <a:headEnd/>
+            <a:tailEnd/>
+          </a:ln>
+        </p:spPr>
+        <p:txBody>
+          <a:bodyPr vert="horz" wrap="square" lIns="91440" tIns="45720" rIns="91440" bIns="45720" numCol="1" anchor="t" anchorCtr="0" compatLnSpc="1">
+            <a:prstTxWarp prst="textNoShape">
+              <a:avLst/>
+            </a:prstTxWarp>
+          </a:bodyPr>
+          <a:lstStyle/>
+          <a:p>
+            <a:endParaRPr lang="en-US"/>
+          </a:p>
+        </p:txBody>
+      </p:sp>
+      <p:sp>
+        <p:nvSpPr>
+          <p:cNvPr id="84" name="Oval 26"/>
+          <p:cNvSpPr>
+            <a:spLocks noChangeArrowheads="1"/>
+          </p:cNvSpPr>
+          <p:nvPr/>
+        </p:nvSpPr>
+        <p:spPr bwMode="auto">
+          <a:xfrm>
+            <a:off x="2657923" y="3351341"/>
+            <a:ext cx="64866" cy="64203"/>
+          </a:xfrm>
+          <a:prstGeom prst="ellipse">
+            <a:avLst/>
+          </a:prstGeom>
+          <a:solidFill>
+            <a:srgbClr val="FF0000"/>
+          </a:solidFill>
+          <a:ln w="0">
+            <a:solidFill>
+              <a:srgbClr val="FF0000"/>
+            </a:solidFill>
+            <a:prstDash val="solid"/>
+            <a:round/>
+            <a:headEnd/>
+            <a:tailEnd/>
+          </a:ln>
+        </p:spPr>
+        <p:txBody>
+          <a:bodyPr vert="horz" wrap="square" lIns="91440" tIns="45720" rIns="91440" bIns="45720" numCol="1" anchor="t" anchorCtr="0" compatLnSpc="1">
+            <a:prstTxWarp prst="textNoShape">
+              <a:avLst/>
+            </a:prstTxWarp>
+          </a:bodyPr>
+          <a:lstStyle/>
+          <a:p>
+            <a:endParaRPr lang="en-US"/>
+          </a:p>
+        </p:txBody>
+      </p:sp>
+      <p:sp>
+        <p:nvSpPr>
+          <p:cNvPr id="85" name="Oval 27"/>
+          <p:cNvSpPr>
+            <a:spLocks noChangeArrowheads="1"/>
+          </p:cNvSpPr>
+          <p:nvPr/>
+        </p:nvSpPr>
+        <p:spPr bwMode="auto">
+          <a:xfrm>
+            <a:off x="2722789" y="3255037"/>
+            <a:ext cx="64866" cy="64203"/>
+          </a:xfrm>
+          <a:prstGeom prst="ellipse">
+            <a:avLst/>
+          </a:prstGeom>
+          <a:solidFill>
+            <a:srgbClr val="FF0000"/>
+          </a:solidFill>
+          <a:ln w="0">
+            <a:solidFill>
+              <a:srgbClr val="FF0000"/>
+            </a:solidFill>
+            <a:prstDash val="solid"/>
+            <a:round/>
+            <a:headEnd/>
+            <a:tailEnd/>
+          </a:ln>
+        </p:spPr>
+        <p:txBody>
+          <a:bodyPr vert="horz" wrap="square" lIns="91440" tIns="45720" rIns="91440" bIns="45720" numCol="1" anchor="t" anchorCtr="0" compatLnSpc="1">
+            <a:prstTxWarp prst="textNoShape">
+              <a:avLst/>
+            </a:prstTxWarp>
+          </a:bodyPr>
+          <a:lstStyle/>
+          <a:p>
+            <a:endParaRPr lang="en-US"/>
+          </a:p>
+        </p:txBody>
+      </p:sp>
+      <p:sp>
+        <p:nvSpPr>
+          <p:cNvPr id="86" name="Oval 28"/>
+          <p:cNvSpPr>
+            <a:spLocks noChangeArrowheads="1"/>
+          </p:cNvSpPr>
+          <p:nvPr/>
+        </p:nvSpPr>
+        <p:spPr bwMode="auto">
+          <a:xfrm>
+            <a:off x="2779547" y="3343316"/>
+            <a:ext cx="64866" cy="64203"/>
+          </a:xfrm>
+          <a:prstGeom prst="ellipse">
+            <a:avLst/>
+          </a:prstGeom>
+          <a:solidFill>
+            <a:srgbClr val="FF0000"/>
+          </a:solidFill>
+          <a:ln w="0">
+            <a:solidFill>
+              <a:srgbClr val="FF0000"/>
+            </a:solidFill>
+            <a:prstDash val="solid"/>
+            <a:round/>
+            <a:headEnd/>
+            <a:tailEnd/>
+          </a:ln>
+        </p:spPr>
+        <p:txBody>
+          <a:bodyPr vert="horz" wrap="square" lIns="91440" tIns="45720" rIns="91440" bIns="45720" numCol="1" anchor="t" anchorCtr="0" compatLnSpc="1">
+            <a:prstTxWarp prst="textNoShape">
+              <a:avLst/>
+            </a:prstTxWarp>
+          </a:bodyPr>
+          <a:lstStyle/>
+          <a:p>
+            <a:endParaRPr lang="en-US"/>
+          </a:p>
+        </p:txBody>
+      </p:sp>
+      <p:sp>
+        <p:nvSpPr>
+          <p:cNvPr id="87" name="Oval 29"/>
+          <p:cNvSpPr>
+            <a:spLocks noChangeArrowheads="1"/>
+          </p:cNvSpPr>
+          <p:nvPr/>
+        </p:nvSpPr>
+        <p:spPr bwMode="auto">
+          <a:xfrm>
+            <a:off x="2844413" y="3471721"/>
+            <a:ext cx="64866" cy="64203"/>
+          </a:xfrm>
+          <a:prstGeom prst="ellipse">
+            <a:avLst/>
+          </a:prstGeom>
+          <a:solidFill>
+            <a:srgbClr val="FF0000"/>
+          </a:solidFill>
+          <a:ln w="0">
+            <a:solidFill>
+              <a:srgbClr val="FF0000"/>
+            </a:solidFill>
+            <a:prstDash val="solid"/>
+            <a:round/>
+            <a:headEnd/>
+            <a:tailEnd/>
+          </a:ln>
+        </p:spPr>
+        <p:txBody>
+          <a:bodyPr vert="horz" wrap="square" lIns="91440" tIns="45720" rIns="91440" bIns="45720" numCol="1" anchor="t" anchorCtr="0" compatLnSpc="1">
+            <a:prstTxWarp prst="textNoShape">
+              <a:avLst/>
+            </a:prstTxWarp>
+          </a:bodyPr>
+          <a:lstStyle/>
+          <a:p>
+            <a:endParaRPr lang="en-US"/>
+          </a:p>
+        </p:txBody>
+      </p:sp>
+      <p:sp>
+        <p:nvSpPr>
+          <p:cNvPr id="89" name="Rectangle 31"/>
+          <p:cNvSpPr>
+            <a:spLocks noChangeArrowheads="1"/>
+          </p:cNvSpPr>
+          <p:nvPr/>
+        </p:nvSpPr>
+        <p:spPr bwMode="auto">
+          <a:xfrm>
+            <a:off x="2033587" y="4515012"/>
+            <a:ext cx="4824413" cy="1580988"/>
+          </a:xfrm>
+          <a:prstGeom prst="rect">
+            <a:avLst/>
+          </a:prstGeom>
+          <a:noFill/>
+          <a:ln w="0">
+            <a:solidFill>
+              <a:srgbClr val="FFFFFF"/>
+            </a:solidFill>
+            <a:prstDash val="solid"/>
+            <a:miter lim="800000"/>
+            <a:headEnd/>
+            <a:tailEnd/>
+          </a:ln>
+          <a:extLst>
+            <a:ext uri="{909E8E84-426E-40DD-AFC4-6F175D3DCCD1}">
+              <a14:hiddenFill xmlns:a14="http://schemas.microsoft.com/office/drawing/2010/main">
+                <a:solidFill>
+                  <a:srgbClr val="FFFFFF"/>
+                </a:solidFill>
+              </a14:hiddenFill>
+            </a:ext>
+          </a:extLst>
+        </p:spPr>
+        <p:txBody>
+          <a:bodyPr vert="horz" wrap="square" lIns="91440" tIns="45720" rIns="91440" bIns="45720" numCol="1" anchor="t" anchorCtr="0" compatLnSpc="1">
+            <a:prstTxWarp prst="textNoShape">
+              <a:avLst/>
+            </a:prstTxWarp>
+          </a:bodyPr>
+          <a:lstStyle/>
+          <a:p>
+            <a:endParaRPr lang="en-US"/>
+          </a:p>
+        </p:txBody>
+      </p:sp>
+      <p:sp>
+        <p:nvSpPr>
+          <p:cNvPr id="90" name="Line 32"/>
+          <p:cNvSpPr>
+            <a:spLocks noChangeShapeType="1"/>
+          </p:cNvSpPr>
+          <p:nvPr/>
+        </p:nvSpPr>
+        <p:spPr bwMode="auto">
+          <a:xfrm>
+            <a:off x="2033587" y="4515012"/>
+            <a:ext cx="4824413" cy="0"/>
+          </a:xfrm>
+          <a:prstGeom prst="line">
+            <a:avLst/>
+          </a:prstGeom>
+          <a:noFill/>
+          <a:ln w="0">
+            <a:solidFill>
+              <a:srgbClr val="000000"/>
+            </a:solidFill>
+            <a:prstDash val="solid"/>
+            <a:round/>
+            <a:headEnd/>
+            <a:tailEnd/>
+          </a:ln>
+          <a:extLst>
+            <a:ext uri="{909E8E84-426E-40DD-AFC4-6F175D3DCCD1}">
+              <a14:hiddenFill xmlns:a14="http://schemas.microsoft.com/office/drawing/2010/main">
+                <a:noFill/>
+              </a14:hiddenFill>
+            </a:ext>
+          </a:extLst>
+        </p:spPr>
+        <p:txBody>
+          <a:bodyPr vert="horz" wrap="square" lIns="91440" tIns="45720" rIns="91440" bIns="45720" numCol="1" anchor="t" anchorCtr="0" compatLnSpc="1">
+            <a:prstTxWarp prst="textNoShape">
+              <a:avLst/>
+            </a:prstTxWarp>
+          </a:bodyPr>
+          <a:lstStyle/>
+          <a:p>
+            <a:endParaRPr lang="en-US"/>
+          </a:p>
+        </p:txBody>
+      </p:sp>
+      <p:sp>
+        <p:nvSpPr>
+          <p:cNvPr id="91" name="Line 33"/>
+          <p:cNvSpPr>
+            <a:spLocks noChangeShapeType="1"/>
+          </p:cNvSpPr>
+          <p:nvPr/>
+        </p:nvSpPr>
+        <p:spPr bwMode="auto">
+          <a:xfrm>
+            <a:off x="2033587" y="6096000"/>
+            <a:ext cx="4824413" cy="0"/>
+          </a:xfrm>
+          <a:prstGeom prst="line">
+            <a:avLst/>
+          </a:prstGeom>
+          <a:noFill/>
+          <a:ln w="0">
+            <a:solidFill>
+              <a:srgbClr val="000000"/>
+            </a:solidFill>
+            <a:prstDash val="solid"/>
+            <a:round/>
+            <a:headEnd/>
+            <a:tailEnd/>
+          </a:ln>
+          <a:extLst>
+            <a:ext uri="{909E8E84-426E-40DD-AFC4-6F175D3DCCD1}">
+              <a14:hiddenFill xmlns:a14="http://schemas.microsoft.com/office/drawing/2010/main">
+                <a:noFill/>
+              </a14:hiddenFill>
+            </a:ext>
+          </a:extLst>
+        </p:spPr>
+        <p:txBody>
+          <a:bodyPr vert="horz" wrap="square" lIns="91440" tIns="45720" rIns="91440" bIns="45720" numCol="1" anchor="t" anchorCtr="0" compatLnSpc="1">
+            <a:prstTxWarp prst="textNoShape">
+              <a:avLst/>
+            </a:prstTxWarp>
+          </a:bodyPr>
+          <a:lstStyle/>
+          <a:p>
+            <a:endParaRPr lang="en-US"/>
+          </a:p>
+        </p:txBody>
+      </p:sp>
+      <p:sp>
+        <p:nvSpPr>
+          <p:cNvPr id="92" name="Line 34"/>
+          <p:cNvSpPr>
+            <a:spLocks noChangeShapeType="1"/>
+          </p:cNvSpPr>
+          <p:nvPr/>
+        </p:nvSpPr>
+        <p:spPr bwMode="auto">
+          <a:xfrm flipV="1">
+            <a:off x="6858000" y="4515012"/>
+            <a:ext cx="0" cy="1580988"/>
+          </a:xfrm>
+          <a:prstGeom prst="line">
+            <a:avLst/>
+          </a:prstGeom>
+          <a:noFill/>
+          <a:ln w="0">
+            <a:solidFill>
+              <a:srgbClr val="000000"/>
+            </a:solidFill>
+            <a:prstDash val="solid"/>
+            <a:round/>
+            <a:headEnd/>
+            <a:tailEnd/>
+          </a:ln>
+          <a:extLst>
+            <a:ext uri="{909E8E84-426E-40DD-AFC4-6F175D3DCCD1}">
+              <a14:hiddenFill xmlns:a14="http://schemas.microsoft.com/office/drawing/2010/main">
+                <a:noFill/>
+              </a14:hiddenFill>
+            </a:ext>
+          </a:extLst>
+        </p:spPr>
+        <p:txBody>
+          <a:bodyPr vert="horz" wrap="square" lIns="91440" tIns="45720" rIns="91440" bIns="45720" numCol="1" anchor="t" anchorCtr="0" compatLnSpc="1">
+            <a:prstTxWarp prst="textNoShape">
+              <a:avLst/>
+            </a:prstTxWarp>
+          </a:bodyPr>
+          <a:lstStyle/>
+          <a:p>
+            <a:endParaRPr lang="en-US"/>
+          </a:p>
+        </p:txBody>
+      </p:sp>
+      <p:sp>
+        <p:nvSpPr>
+          <p:cNvPr id="93" name="Line 35"/>
+          <p:cNvSpPr>
+            <a:spLocks noChangeShapeType="1"/>
+          </p:cNvSpPr>
+          <p:nvPr/>
+        </p:nvSpPr>
+        <p:spPr bwMode="auto">
+          <a:xfrm flipV="1">
+            <a:off x="2033587" y="4515012"/>
+            <a:ext cx="0" cy="1580988"/>
+          </a:xfrm>
+          <a:prstGeom prst="line">
+            <a:avLst/>
+          </a:prstGeom>
+          <a:noFill/>
+          <a:ln w="0">
+            <a:solidFill>
+              <a:srgbClr val="000000"/>
+            </a:solidFill>
+            <a:prstDash val="solid"/>
+            <a:round/>
+            <a:headEnd/>
+            <a:tailEnd/>
+          </a:ln>
+          <a:extLst>
+            <a:ext uri="{909E8E84-426E-40DD-AFC4-6F175D3DCCD1}">
+              <a14:hiddenFill xmlns:a14="http://schemas.microsoft.com/office/drawing/2010/main">
+                <a:noFill/>
+              </a14:hiddenFill>
+            </a:ext>
+          </a:extLst>
+        </p:spPr>
+        <p:txBody>
+          <a:bodyPr vert="horz" wrap="square" lIns="91440" tIns="45720" rIns="91440" bIns="45720" numCol="1" anchor="t" anchorCtr="0" compatLnSpc="1">
+            <a:prstTxWarp prst="textNoShape">
+              <a:avLst/>
+            </a:prstTxWarp>
+          </a:bodyPr>
+          <a:lstStyle/>
+          <a:p>
+            <a:endParaRPr lang="en-US"/>
+          </a:p>
+        </p:txBody>
+      </p:sp>
+      <p:sp>
+        <p:nvSpPr>
+          <p:cNvPr id="94" name="Line 36"/>
+          <p:cNvSpPr>
+            <a:spLocks noChangeShapeType="1"/>
+          </p:cNvSpPr>
+          <p:nvPr/>
+        </p:nvSpPr>
+        <p:spPr bwMode="auto">
+          <a:xfrm>
+            <a:off x="2033587" y="6096000"/>
+            <a:ext cx="4824413" cy="0"/>
+          </a:xfrm>
+          <a:prstGeom prst="line">
+            <a:avLst/>
+          </a:prstGeom>
+          <a:noFill/>
+          <a:ln w="0">
+            <a:solidFill>
+              <a:srgbClr val="000000"/>
+            </a:solidFill>
+            <a:prstDash val="solid"/>
+            <a:round/>
+            <a:headEnd/>
+            <a:tailEnd/>
+          </a:ln>
+          <a:extLst>
+            <a:ext uri="{909E8E84-426E-40DD-AFC4-6F175D3DCCD1}">
+              <a14:hiddenFill xmlns:a14="http://schemas.microsoft.com/office/drawing/2010/main">
+                <a:noFill/>
+              </a14:hiddenFill>
+            </a:ext>
+          </a:extLst>
+        </p:spPr>
+        <p:txBody>
+          <a:bodyPr vert="horz" wrap="square" lIns="91440" tIns="45720" rIns="91440" bIns="45720" numCol="1" anchor="t" anchorCtr="0" compatLnSpc="1">
+            <a:prstTxWarp prst="textNoShape">
+              <a:avLst/>
+            </a:prstTxWarp>
+          </a:bodyPr>
+          <a:lstStyle/>
+          <a:p>
+            <a:endParaRPr lang="en-US"/>
+          </a:p>
+        </p:txBody>
+      </p:sp>
+      <p:sp>
+        <p:nvSpPr>
+          <p:cNvPr id="95" name="Line 37"/>
+          <p:cNvSpPr>
+            <a:spLocks noChangeShapeType="1"/>
+          </p:cNvSpPr>
+          <p:nvPr/>
+        </p:nvSpPr>
+        <p:spPr bwMode="auto">
+          <a:xfrm flipV="1">
+            <a:off x="2033587" y="4515012"/>
+            <a:ext cx="0" cy="1580988"/>
+          </a:xfrm>
+          <a:prstGeom prst="line">
+            <a:avLst/>
+          </a:prstGeom>
+          <a:noFill/>
+          <a:ln w="0">
+            <a:solidFill>
+              <a:srgbClr val="000000"/>
+            </a:solidFill>
+            <a:prstDash val="solid"/>
+            <a:round/>
+            <a:headEnd/>
+            <a:tailEnd/>
+          </a:ln>
+          <a:extLst>
+            <a:ext uri="{909E8E84-426E-40DD-AFC4-6F175D3DCCD1}">
+              <a14:hiddenFill xmlns:a14="http://schemas.microsoft.com/office/drawing/2010/main">
+                <a:noFill/>
+              </a14:hiddenFill>
+            </a:ext>
+          </a:extLst>
+        </p:spPr>
+        <p:txBody>
+          <a:bodyPr vert="horz" wrap="square" lIns="91440" tIns="45720" rIns="91440" bIns="45720" numCol="1" anchor="t" anchorCtr="0" compatLnSpc="1">
+            <a:prstTxWarp prst="textNoShape">
+              <a:avLst/>
+            </a:prstTxWarp>
+          </a:bodyPr>
+          <a:lstStyle/>
+          <a:p>
+            <a:endParaRPr lang="en-US"/>
+          </a:p>
+        </p:txBody>
+      </p:sp>
+      <p:sp>
+        <p:nvSpPr>
+          <p:cNvPr id="96" name="Line 38"/>
+          <p:cNvSpPr>
+            <a:spLocks noChangeShapeType="1"/>
+          </p:cNvSpPr>
+          <p:nvPr/>
+        </p:nvSpPr>
+        <p:spPr bwMode="auto">
+          <a:xfrm>
+            <a:off x="2033587" y="4515012"/>
+            <a:ext cx="4824413" cy="0"/>
+          </a:xfrm>
+          <a:prstGeom prst="line">
+            <a:avLst/>
+          </a:prstGeom>
+          <a:noFill/>
+          <a:ln w="0">
+            <a:solidFill>
+              <a:srgbClr val="000000"/>
+            </a:solidFill>
+            <a:prstDash val="solid"/>
+            <a:round/>
+            <a:headEnd/>
+            <a:tailEnd/>
+          </a:ln>
+          <a:extLst>
+            <a:ext uri="{909E8E84-426E-40DD-AFC4-6F175D3DCCD1}">
+              <a14:hiddenFill xmlns:a14="http://schemas.microsoft.com/office/drawing/2010/main">
+                <a:noFill/>
+              </a14:hiddenFill>
+            </a:ext>
+          </a:extLst>
+        </p:spPr>
+        <p:txBody>
+          <a:bodyPr vert="horz" wrap="square" lIns="91440" tIns="45720" rIns="91440" bIns="45720" numCol="1" anchor="t" anchorCtr="0" compatLnSpc="1">
+            <a:prstTxWarp prst="textNoShape">
+              <a:avLst/>
+            </a:prstTxWarp>
+          </a:bodyPr>
+          <a:lstStyle/>
+          <a:p>
+            <a:endParaRPr lang="en-US"/>
+          </a:p>
+        </p:txBody>
+      </p:sp>
+      <p:sp>
+        <p:nvSpPr>
+          <p:cNvPr id="97" name="Line 39"/>
+          <p:cNvSpPr>
+            <a:spLocks noChangeShapeType="1"/>
+          </p:cNvSpPr>
+          <p:nvPr/>
+        </p:nvSpPr>
+        <p:spPr bwMode="auto">
+          <a:xfrm>
+            <a:off x="2033587" y="6096000"/>
+            <a:ext cx="4824413" cy="0"/>
+          </a:xfrm>
+          <a:prstGeom prst="line">
+            <a:avLst/>
+          </a:prstGeom>
+          <a:noFill/>
+          <a:ln w="0">
+            <a:solidFill>
+              <a:srgbClr val="000000"/>
+            </a:solidFill>
+            <a:prstDash val="solid"/>
+            <a:round/>
+            <a:headEnd/>
+            <a:tailEnd/>
+          </a:ln>
+          <a:extLst>
+            <a:ext uri="{909E8E84-426E-40DD-AFC4-6F175D3DCCD1}">
+              <a14:hiddenFill xmlns:a14="http://schemas.microsoft.com/office/drawing/2010/main">
+                <a:noFill/>
+              </a14:hiddenFill>
+            </a:ext>
+          </a:extLst>
+        </p:spPr>
+        <p:txBody>
+          <a:bodyPr vert="horz" wrap="square" lIns="91440" tIns="45720" rIns="91440" bIns="45720" numCol="1" anchor="t" anchorCtr="0" compatLnSpc="1">
+            <a:prstTxWarp prst="textNoShape">
+              <a:avLst/>
+            </a:prstTxWarp>
+          </a:bodyPr>
+          <a:lstStyle/>
+          <a:p>
+            <a:endParaRPr lang="en-US"/>
+          </a:p>
+        </p:txBody>
+      </p:sp>
+      <p:sp>
+        <p:nvSpPr>
+          <p:cNvPr id="98" name="Line 40"/>
+          <p:cNvSpPr>
+            <a:spLocks noChangeShapeType="1"/>
+          </p:cNvSpPr>
+          <p:nvPr/>
+        </p:nvSpPr>
+        <p:spPr bwMode="auto">
+          <a:xfrm flipV="1">
+            <a:off x="6858000" y="4515012"/>
+            <a:ext cx="0" cy="1580988"/>
+          </a:xfrm>
+          <a:prstGeom prst="line">
+            <a:avLst/>
+          </a:prstGeom>
+          <a:noFill/>
+          <a:ln w="0">
+            <a:solidFill>
+              <a:srgbClr val="000000"/>
+            </a:solidFill>
+            <a:prstDash val="solid"/>
+            <a:round/>
+            <a:headEnd/>
+            <a:tailEnd/>
+          </a:ln>
+          <a:extLst>
+            <a:ext uri="{909E8E84-426E-40DD-AFC4-6F175D3DCCD1}">
+              <a14:hiddenFill xmlns:a14="http://schemas.microsoft.com/office/drawing/2010/main">
+                <a:noFill/>
+              </a14:hiddenFill>
+            </a:ext>
+          </a:extLst>
+        </p:spPr>
+        <p:txBody>
+          <a:bodyPr vert="horz" wrap="square" lIns="91440" tIns="45720" rIns="91440" bIns="45720" numCol="1" anchor="t" anchorCtr="0" compatLnSpc="1">
+            <a:prstTxWarp prst="textNoShape">
+              <a:avLst/>
+            </a:prstTxWarp>
+          </a:bodyPr>
+          <a:lstStyle/>
+          <a:p>
+            <a:endParaRPr lang="en-US"/>
+          </a:p>
+        </p:txBody>
+      </p:sp>
+      <p:sp>
+        <p:nvSpPr>
+          <p:cNvPr id="99" name="Line 41"/>
+          <p:cNvSpPr>
+            <a:spLocks noChangeShapeType="1"/>
+          </p:cNvSpPr>
+          <p:nvPr/>
+        </p:nvSpPr>
+        <p:spPr bwMode="auto">
+          <a:xfrm flipV="1">
+            <a:off x="2033587" y="4515012"/>
+            <a:ext cx="0" cy="1580988"/>
+          </a:xfrm>
+          <a:prstGeom prst="line">
+            <a:avLst/>
+          </a:prstGeom>
+          <a:noFill/>
+          <a:ln w="0">
+            <a:solidFill>
+              <a:srgbClr val="000000"/>
+            </a:solidFill>
+            <a:prstDash val="solid"/>
+            <a:round/>
+            <a:headEnd/>
+            <a:tailEnd/>
+          </a:ln>
+          <a:extLst>
+            <a:ext uri="{909E8E84-426E-40DD-AFC4-6F175D3DCCD1}">
+              <a14:hiddenFill xmlns:a14="http://schemas.microsoft.com/office/drawing/2010/main">
+                <a:noFill/>
+              </a14:hiddenFill>
+            </a:ext>
+          </a:extLst>
+        </p:spPr>
+        <p:txBody>
+          <a:bodyPr vert="horz" wrap="square" lIns="91440" tIns="45720" rIns="91440" bIns="45720" numCol="1" anchor="t" anchorCtr="0" compatLnSpc="1">
+            <a:prstTxWarp prst="textNoShape">
+              <a:avLst/>
+            </a:prstTxWarp>
+          </a:bodyPr>
+          <a:lstStyle/>
+          <a:p>
+            <a:endParaRPr lang="en-US"/>
+          </a:p>
+        </p:txBody>
+      </p:sp>
+      <p:sp>
+        <p:nvSpPr>
+          <p:cNvPr id="100" name="Oval 42"/>
+          <p:cNvSpPr>
+            <a:spLocks noChangeArrowheads="1"/>
+          </p:cNvSpPr>
+          <p:nvPr/>
+        </p:nvSpPr>
+        <p:spPr bwMode="auto">
+          <a:xfrm>
+            <a:off x="2179536" y="5566329"/>
+            <a:ext cx="64866" cy="64203"/>
+          </a:xfrm>
+          <a:prstGeom prst="ellipse">
+            <a:avLst/>
+          </a:prstGeom>
+          <a:solidFill>
+            <a:srgbClr val="FF0000"/>
+          </a:solidFill>
+          <a:ln w="0">
+            <a:solidFill>
+              <a:srgbClr val="FF0000"/>
+            </a:solidFill>
+            <a:prstDash val="solid"/>
+            <a:round/>
+            <a:headEnd/>
+            <a:tailEnd/>
+          </a:ln>
+        </p:spPr>
+        <p:txBody>
+          <a:bodyPr vert="horz" wrap="square" lIns="91440" tIns="45720" rIns="91440" bIns="45720" numCol="1" anchor="t" anchorCtr="0" compatLnSpc="1">
+            <a:prstTxWarp prst="textNoShape">
+              <a:avLst/>
+            </a:prstTxWarp>
+          </a:bodyPr>
+          <a:lstStyle/>
+          <a:p>
+            <a:endParaRPr lang="en-US"/>
+          </a:p>
+        </p:txBody>
+      </p:sp>
+      <p:sp>
+        <p:nvSpPr>
+          <p:cNvPr id="101" name="Oval 43"/>
+          <p:cNvSpPr>
+            <a:spLocks noChangeArrowheads="1"/>
+          </p:cNvSpPr>
+          <p:nvPr/>
+        </p:nvSpPr>
+        <p:spPr bwMode="auto">
+          <a:xfrm>
+            <a:off x="2236293" y="5325569"/>
+            <a:ext cx="64866" cy="64203"/>
+          </a:xfrm>
+          <a:prstGeom prst="ellipse">
+            <a:avLst/>
+          </a:prstGeom>
+          <a:solidFill>
+            <a:srgbClr val="FF0000"/>
+          </a:solidFill>
+          <a:ln w="0">
+            <a:solidFill>
+              <a:srgbClr val="FF0000"/>
+            </a:solidFill>
+            <a:prstDash val="solid"/>
+            <a:round/>
+            <a:headEnd/>
+            <a:tailEnd/>
+          </a:ln>
+        </p:spPr>
+        <p:txBody>
+          <a:bodyPr vert="horz" wrap="square" lIns="91440" tIns="45720" rIns="91440" bIns="45720" numCol="1" anchor="t" anchorCtr="0" compatLnSpc="1">
+            <a:prstTxWarp prst="textNoShape">
+              <a:avLst/>
+            </a:prstTxWarp>
+          </a:bodyPr>
+          <a:lstStyle/>
+          <a:p>
+            <a:endParaRPr lang="en-US"/>
+          </a:p>
+        </p:txBody>
+      </p:sp>
+      <p:sp>
+        <p:nvSpPr>
+          <p:cNvPr id="102" name="Oval 44"/>
+          <p:cNvSpPr>
+            <a:spLocks noChangeArrowheads="1"/>
+          </p:cNvSpPr>
+          <p:nvPr/>
+        </p:nvSpPr>
+        <p:spPr bwMode="auto">
+          <a:xfrm>
+            <a:off x="2301159" y="5598430"/>
+            <a:ext cx="64866" cy="64203"/>
+          </a:xfrm>
+          <a:prstGeom prst="ellipse">
+            <a:avLst/>
+          </a:prstGeom>
+          <a:solidFill>
+            <a:srgbClr val="FF0000"/>
+          </a:solidFill>
+          <a:ln w="0">
+            <a:solidFill>
+              <a:srgbClr val="FF0000"/>
+            </a:solidFill>
+            <a:prstDash val="solid"/>
+            <a:round/>
+            <a:headEnd/>
+            <a:tailEnd/>
+          </a:ln>
+        </p:spPr>
+        <p:txBody>
+          <a:bodyPr vert="horz" wrap="square" lIns="91440" tIns="45720" rIns="91440" bIns="45720" numCol="1" anchor="t" anchorCtr="0" compatLnSpc="1">
+            <a:prstTxWarp prst="textNoShape">
+              <a:avLst/>
+            </a:prstTxWarp>
+          </a:bodyPr>
+          <a:lstStyle/>
+          <a:p>
+            <a:endParaRPr lang="en-US"/>
+          </a:p>
+        </p:txBody>
+      </p:sp>
+      <p:sp>
+        <p:nvSpPr>
+          <p:cNvPr id="103" name="Oval 45"/>
+          <p:cNvSpPr>
+            <a:spLocks noChangeArrowheads="1"/>
+          </p:cNvSpPr>
+          <p:nvPr/>
+        </p:nvSpPr>
+        <p:spPr bwMode="auto">
+          <a:xfrm>
+            <a:off x="2357917" y="5397797"/>
+            <a:ext cx="64866" cy="64203"/>
+          </a:xfrm>
+          <a:prstGeom prst="ellipse">
+            <a:avLst/>
+          </a:prstGeom>
+          <a:solidFill>
+            <a:srgbClr val="FF0000"/>
+          </a:solidFill>
+          <a:ln w="0">
+            <a:solidFill>
+              <a:srgbClr val="FF0000"/>
+            </a:solidFill>
+            <a:prstDash val="solid"/>
+            <a:round/>
+            <a:headEnd/>
+            <a:tailEnd/>
+          </a:ln>
+        </p:spPr>
+        <p:txBody>
+          <a:bodyPr vert="horz" wrap="square" lIns="91440" tIns="45720" rIns="91440" bIns="45720" numCol="1" anchor="t" anchorCtr="0" compatLnSpc="1">
+            <a:prstTxWarp prst="textNoShape">
+              <a:avLst/>
+            </a:prstTxWarp>
+          </a:bodyPr>
+          <a:lstStyle/>
+          <a:p>
+            <a:endParaRPr lang="en-US"/>
+          </a:p>
+        </p:txBody>
+      </p:sp>
+      <p:sp>
+        <p:nvSpPr>
+          <p:cNvPr id="104" name="Oval 46"/>
+          <p:cNvSpPr>
+            <a:spLocks noChangeArrowheads="1"/>
+          </p:cNvSpPr>
+          <p:nvPr/>
+        </p:nvSpPr>
+        <p:spPr bwMode="auto">
+          <a:xfrm>
+            <a:off x="2422783" y="5237291"/>
+            <a:ext cx="64866" cy="64203"/>
+          </a:xfrm>
+          <a:prstGeom prst="ellipse">
+            <a:avLst/>
+          </a:prstGeom>
+          <a:solidFill>
+            <a:srgbClr val="FF0000"/>
+          </a:solidFill>
+          <a:ln w="0">
+            <a:solidFill>
+              <a:srgbClr val="FF0000"/>
+            </a:solidFill>
+            <a:prstDash val="solid"/>
+            <a:round/>
+            <a:headEnd/>
+            <a:tailEnd/>
+          </a:ln>
+        </p:spPr>
+        <p:txBody>
+          <a:bodyPr vert="horz" wrap="square" lIns="91440" tIns="45720" rIns="91440" bIns="45720" numCol="1" anchor="t" anchorCtr="0" compatLnSpc="1">
+            <a:prstTxWarp prst="textNoShape">
+              <a:avLst/>
+            </a:prstTxWarp>
+          </a:bodyPr>
+          <a:lstStyle/>
+          <a:p>
+            <a:endParaRPr lang="en-US"/>
+          </a:p>
+        </p:txBody>
+      </p:sp>
+      <p:sp>
+        <p:nvSpPr>
+          <p:cNvPr id="105" name="Oval 47"/>
+          <p:cNvSpPr>
+            <a:spLocks noChangeArrowheads="1"/>
+          </p:cNvSpPr>
+          <p:nvPr/>
+        </p:nvSpPr>
+        <p:spPr bwMode="auto">
+          <a:xfrm>
+            <a:off x="2479541" y="5036658"/>
+            <a:ext cx="64866" cy="64203"/>
+          </a:xfrm>
+          <a:prstGeom prst="ellipse">
+            <a:avLst/>
+          </a:prstGeom>
+          <a:solidFill>
+            <a:srgbClr val="FF0000"/>
+          </a:solidFill>
+          <a:ln w="0">
+            <a:solidFill>
+              <a:srgbClr val="FF0000"/>
+            </a:solidFill>
+            <a:prstDash val="solid"/>
+            <a:round/>
+            <a:headEnd/>
+            <a:tailEnd/>
+          </a:ln>
+        </p:spPr>
+        <p:txBody>
+          <a:bodyPr vert="horz" wrap="square" lIns="91440" tIns="45720" rIns="91440" bIns="45720" numCol="1" anchor="t" anchorCtr="0" compatLnSpc="1">
+            <a:prstTxWarp prst="textNoShape">
+              <a:avLst/>
+            </a:prstTxWarp>
+          </a:bodyPr>
+          <a:lstStyle/>
+          <a:p>
+            <a:endParaRPr lang="en-US"/>
+          </a:p>
+        </p:txBody>
+      </p:sp>
+      <p:sp>
+        <p:nvSpPr>
+          <p:cNvPr id="106" name="Oval 48"/>
+          <p:cNvSpPr>
+            <a:spLocks noChangeArrowheads="1"/>
+          </p:cNvSpPr>
+          <p:nvPr/>
+        </p:nvSpPr>
+        <p:spPr bwMode="auto">
+          <a:xfrm>
+            <a:off x="2536299" y="5044683"/>
+            <a:ext cx="64866" cy="64203"/>
+          </a:xfrm>
+          <a:prstGeom prst="ellipse">
+            <a:avLst/>
+          </a:prstGeom>
+          <a:solidFill>
+            <a:srgbClr val="FF0000"/>
+          </a:solidFill>
+          <a:ln w="0">
+            <a:solidFill>
+              <a:srgbClr val="FF0000"/>
+            </a:solidFill>
+            <a:prstDash val="solid"/>
+            <a:round/>
+            <a:headEnd/>
+            <a:tailEnd/>
+          </a:ln>
+        </p:spPr>
+        <p:txBody>
+          <a:bodyPr vert="horz" wrap="square" lIns="91440" tIns="45720" rIns="91440" bIns="45720" numCol="1" anchor="t" anchorCtr="0" compatLnSpc="1">
+            <a:prstTxWarp prst="textNoShape">
+              <a:avLst/>
+            </a:prstTxWarp>
+          </a:bodyPr>
+          <a:lstStyle/>
+          <a:p>
+            <a:endParaRPr lang="en-US"/>
+          </a:p>
+        </p:txBody>
+      </p:sp>
+      <p:sp>
+        <p:nvSpPr>
+          <p:cNvPr id="107" name="Oval 49"/>
+          <p:cNvSpPr>
+            <a:spLocks noChangeArrowheads="1"/>
+          </p:cNvSpPr>
+          <p:nvPr/>
+        </p:nvSpPr>
+        <p:spPr bwMode="auto">
+          <a:xfrm>
+            <a:off x="2601165" y="4868126"/>
+            <a:ext cx="64866" cy="64203"/>
+          </a:xfrm>
+          <a:prstGeom prst="ellipse">
+            <a:avLst/>
+          </a:prstGeom>
+          <a:solidFill>
+            <a:srgbClr val="FF0000"/>
+          </a:solidFill>
+          <a:ln w="0">
+            <a:solidFill>
+              <a:srgbClr val="FF0000"/>
+            </a:solidFill>
+            <a:prstDash val="solid"/>
+            <a:round/>
+            <a:headEnd/>
+            <a:tailEnd/>
+          </a:ln>
+        </p:spPr>
+        <p:txBody>
+          <a:bodyPr vert="horz" wrap="square" lIns="91440" tIns="45720" rIns="91440" bIns="45720" numCol="1" anchor="t" anchorCtr="0" compatLnSpc="1">
+            <a:prstTxWarp prst="textNoShape">
+              <a:avLst/>
+            </a:prstTxWarp>
+          </a:bodyPr>
+          <a:lstStyle/>
+          <a:p>
+            <a:endParaRPr lang="en-US"/>
+          </a:p>
+        </p:txBody>
+      </p:sp>
+      <p:sp>
+        <p:nvSpPr>
+          <p:cNvPr id="108" name="Oval 50"/>
+          <p:cNvSpPr>
+            <a:spLocks noChangeArrowheads="1"/>
+          </p:cNvSpPr>
+          <p:nvPr/>
+        </p:nvSpPr>
+        <p:spPr bwMode="auto">
+          <a:xfrm>
+            <a:off x="2657923" y="5550278"/>
+            <a:ext cx="64866" cy="64203"/>
+          </a:xfrm>
+          <a:prstGeom prst="ellipse">
+            <a:avLst/>
+          </a:prstGeom>
+          <a:solidFill>
+            <a:srgbClr val="FF0000"/>
+          </a:solidFill>
+          <a:ln w="0">
+            <a:solidFill>
+              <a:srgbClr val="FF0000"/>
+            </a:solidFill>
+            <a:prstDash val="solid"/>
+            <a:round/>
+            <a:headEnd/>
+            <a:tailEnd/>
+          </a:ln>
+        </p:spPr>
+        <p:txBody>
+          <a:bodyPr vert="horz" wrap="square" lIns="91440" tIns="45720" rIns="91440" bIns="45720" numCol="1" anchor="t" anchorCtr="0" compatLnSpc="1">
+            <a:prstTxWarp prst="textNoShape">
+              <a:avLst/>
+            </a:prstTxWarp>
+          </a:bodyPr>
+          <a:lstStyle/>
+          <a:p>
+            <a:endParaRPr lang="en-US"/>
+          </a:p>
+        </p:txBody>
+      </p:sp>
+      <p:sp>
+        <p:nvSpPr>
+          <p:cNvPr id="109" name="Oval 51"/>
+          <p:cNvSpPr>
+            <a:spLocks noChangeArrowheads="1"/>
+          </p:cNvSpPr>
+          <p:nvPr/>
+        </p:nvSpPr>
+        <p:spPr bwMode="auto">
+          <a:xfrm>
+            <a:off x="2722789" y="5140987"/>
+            <a:ext cx="64866" cy="64203"/>
+          </a:xfrm>
+          <a:prstGeom prst="ellipse">
+            <a:avLst/>
+          </a:prstGeom>
+          <a:solidFill>
+            <a:srgbClr val="FF0000"/>
+          </a:solidFill>
+          <a:ln w="0">
+            <a:solidFill>
+              <a:srgbClr val="FF0000"/>
+            </a:solidFill>
+            <a:prstDash val="solid"/>
+            <a:round/>
+            <a:headEnd/>
+            <a:tailEnd/>
+          </a:ln>
+        </p:spPr>
+        <p:txBody>
+          <a:bodyPr vert="horz" wrap="square" lIns="91440" tIns="45720" rIns="91440" bIns="45720" numCol="1" anchor="t" anchorCtr="0" compatLnSpc="1">
+            <a:prstTxWarp prst="textNoShape">
+              <a:avLst/>
+            </a:prstTxWarp>
+          </a:bodyPr>
+          <a:lstStyle/>
+          <a:p>
+            <a:endParaRPr lang="en-US"/>
+          </a:p>
+        </p:txBody>
+      </p:sp>
+      <p:sp>
+        <p:nvSpPr>
+          <p:cNvPr id="110" name="Oval 52"/>
+          <p:cNvSpPr>
+            <a:spLocks noChangeArrowheads="1"/>
+          </p:cNvSpPr>
+          <p:nvPr/>
+        </p:nvSpPr>
+        <p:spPr bwMode="auto">
+          <a:xfrm>
+            <a:off x="2779547" y="5702759"/>
+            <a:ext cx="64866" cy="64203"/>
+          </a:xfrm>
+          <a:prstGeom prst="ellipse">
+            <a:avLst/>
+          </a:prstGeom>
+          <a:solidFill>
+            <a:srgbClr val="FF0000"/>
+          </a:solidFill>
+          <a:ln w="0">
+            <a:solidFill>
+              <a:srgbClr val="FF0000"/>
+            </a:solidFill>
+            <a:prstDash val="solid"/>
+            <a:round/>
+            <a:headEnd/>
+            <a:tailEnd/>
+          </a:ln>
+        </p:spPr>
+        <p:txBody>
+          <a:bodyPr vert="horz" wrap="square" lIns="91440" tIns="45720" rIns="91440" bIns="45720" numCol="1" anchor="t" anchorCtr="0" compatLnSpc="1">
+            <a:prstTxWarp prst="textNoShape">
+              <a:avLst/>
+            </a:prstTxWarp>
+          </a:bodyPr>
+          <a:lstStyle/>
+          <a:p>
+            <a:endParaRPr lang="en-US"/>
+          </a:p>
+        </p:txBody>
+      </p:sp>
+      <p:sp>
+        <p:nvSpPr>
+          <p:cNvPr id="111" name="Oval 53"/>
+          <p:cNvSpPr>
+            <a:spLocks noChangeArrowheads="1"/>
+          </p:cNvSpPr>
+          <p:nvPr/>
+        </p:nvSpPr>
+        <p:spPr bwMode="auto">
+          <a:xfrm>
+            <a:off x="2844413" y="5734861"/>
+            <a:ext cx="64866" cy="64203"/>
+          </a:xfrm>
+          <a:prstGeom prst="ellipse">
+            <a:avLst/>
+          </a:prstGeom>
+          <a:solidFill>
+            <a:srgbClr val="FF0000"/>
+          </a:solidFill>
+          <a:ln w="0">
+            <a:solidFill>
+              <a:srgbClr val="FF0000"/>
+            </a:solidFill>
+            <a:prstDash val="solid"/>
+            <a:round/>
+            <a:headEnd/>
+            <a:tailEnd/>
+          </a:ln>
+        </p:spPr>
+        <p:txBody>
+          <a:bodyPr vert="horz" wrap="square" lIns="91440" tIns="45720" rIns="91440" bIns="45720" numCol="1" anchor="t" anchorCtr="0" compatLnSpc="1">
+            <a:prstTxWarp prst="textNoShape">
+              <a:avLst/>
+            </a:prstTxWarp>
+          </a:bodyPr>
+          <a:lstStyle/>
+          <a:p>
+            <a:endParaRPr lang="en-US"/>
+          </a:p>
+        </p:txBody>
+      </p:sp>
+      <p:sp>
+        <p:nvSpPr>
+          <p:cNvPr id="112" name="Oval 54"/>
+          <p:cNvSpPr>
+            <a:spLocks noChangeArrowheads="1"/>
+          </p:cNvSpPr>
+          <p:nvPr/>
+        </p:nvSpPr>
+        <p:spPr bwMode="auto">
+          <a:xfrm>
+            <a:off x="2901171" y="5766962"/>
+            <a:ext cx="64866" cy="64203"/>
+          </a:xfrm>
+          <a:prstGeom prst="ellipse">
+            <a:avLst/>
+          </a:prstGeom>
+          <a:solidFill>
+            <a:srgbClr val="FF0000"/>
+          </a:solidFill>
+          <a:ln w="0">
+            <a:solidFill>
+              <a:srgbClr val="FF0000"/>
+            </a:solidFill>
+            <a:prstDash val="solid"/>
+            <a:round/>
+            <a:headEnd/>
+            <a:tailEnd/>
+          </a:ln>
+        </p:spPr>
+        <p:txBody>
+          <a:bodyPr vert="horz" wrap="square" lIns="91440" tIns="45720" rIns="91440" bIns="45720" numCol="1" anchor="t" anchorCtr="0" compatLnSpc="1">
+            <a:prstTxWarp prst="textNoShape">
+              <a:avLst/>
+            </a:prstTxWarp>
+          </a:bodyPr>
+          <a:lstStyle/>
+          <a:p>
+            <a:endParaRPr lang="en-US"/>
+          </a:p>
+        </p:txBody>
+      </p:sp>
+      <p:sp>
+        <p:nvSpPr>
+          <p:cNvPr id="113" name="Oval 55"/>
+          <p:cNvSpPr>
+            <a:spLocks noChangeArrowheads="1"/>
+          </p:cNvSpPr>
+          <p:nvPr/>
+        </p:nvSpPr>
+        <p:spPr bwMode="auto">
+          <a:xfrm>
+            <a:off x="2966037" y="5734861"/>
+            <a:ext cx="64866" cy="64203"/>
+          </a:xfrm>
+          <a:prstGeom prst="ellipse">
+            <a:avLst/>
+          </a:prstGeom>
+          <a:solidFill>
+            <a:srgbClr val="FF0000"/>
+          </a:solidFill>
+          <a:ln w="0">
+            <a:solidFill>
+              <a:srgbClr val="FF0000"/>
+            </a:solidFill>
+            <a:prstDash val="solid"/>
+            <a:round/>
+            <a:headEnd/>
+            <a:tailEnd/>
+          </a:ln>
+        </p:spPr>
+        <p:txBody>
+          <a:bodyPr vert="horz" wrap="square" lIns="91440" tIns="45720" rIns="91440" bIns="45720" numCol="1" anchor="t" anchorCtr="0" compatLnSpc="1">
+            <a:prstTxWarp prst="textNoShape">
+              <a:avLst/>
+            </a:prstTxWarp>
+          </a:bodyPr>
+          <a:lstStyle/>
+          <a:p>
+            <a:endParaRPr lang="en-US"/>
+          </a:p>
+        </p:txBody>
+      </p:sp>
+      <p:sp>
+        <p:nvSpPr>
+          <p:cNvPr id="114" name="Oval 56"/>
+          <p:cNvSpPr>
+            <a:spLocks noChangeArrowheads="1"/>
+          </p:cNvSpPr>
+          <p:nvPr/>
+        </p:nvSpPr>
+        <p:spPr bwMode="auto">
+          <a:xfrm>
+            <a:off x="3322800" y="5758937"/>
+            <a:ext cx="64866" cy="64203"/>
+          </a:xfrm>
+          <a:prstGeom prst="ellipse">
+            <a:avLst/>
+          </a:prstGeom>
+          <a:solidFill>
+            <a:srgbClr val="FF0000"/>
+          </a:solidFill>
+          <a:ln w="0">
+            <a:solidFill>
+              <a:srgbClr val="FF0000"/>
+            </a:solidFill>
+            <a:prstDash val="solid"/>
+            <a:round/>
+            <a:headEnd/>
+            <a:tailEnd/>
+          </a:ln>
+        </p:spPr>
+        <p:txBody>
+          <a:bodyPr vert="horz" wrap="square" lIns="91440" tIns="45720" rIns="91440" bIns="45720" numCol="1" anchor="t" anchorCtr="0" compatLnSpc="1">
+            <a:prstTxWarp prst="textNoShape">
+              <a:avLst/>
+            </a:prstTxWarp>
+          </a:bodyPr>
+          <a:lstStyle/>
+          <a:p>
+            <a:endParaRPr lang="en-US"/>
+          </a:p>
+        </p:txBody>
+      </p:sp>
+      <p:sp>
+        <p:nvSpPr>
+          <p:cNvPr id="115" name="Oval 57"/>
+          <p:cNvSpPr>
+            <a:spLocks noChangeArrowheads="1"/>
+          </p:cNvSpPr>
+          <p:nvPr/>
+        </p:nvSpPr>
+        <p:spPr bwMode="auto">
+          <a:xfrm>
+            <a:off x="3387666" y="5389772"/>
+            <a:ext cx="64866" cy="64203"/>
+          </a:xfrm>
+          <a:prstGeom prst="ellipse">
+            <a:avLst/>
+          </a:prstGeom>
+          <a:solidFill>
+            <a:srgbClr val="FF0000"/>
+          </a:solidFill>
+          <a:ln w="0">
+            <a:solidFill>
+              <a:srgbClr val="FF0000"/>
+            </a:solidFill>
+            <a:prstDash val="solid"/>
+            <a:round/>
+            <a:headEnd/>
+            <a:tailEnd/>
+          </a:ln>
+        </p:spPr>
+        <p:txBody>
+          <a:bodyPr vert="horz" wrap="square" lIns="91440" tIns="45720" rIns="91440" bIns="45720" numCol="1" anchor="t" anchorCtr="0" compatLnSpc="1">
+            <a:prstTxWarp prst="textNoShape">
+              <a:avLst/>
+            </a:prstTxWarp>
+          </a:bodyPr>
+          <a:lstStyle/>
+          <a:p>
+            <a:endParaRPr lang="en-US"/>
+          </a:p>
+        </p:txBody>
+      </p:sp>
+      <p:sp>
+        <p:nvSpPr>
+          <p:cNvPr id="1055" name="Left Arrow 1054"/>
+          <p:cNvSpPr/>
+          <p:nvPr/>
+        </p:nvSpPr>
+        <p:spPr>
+          <a:xfrm>
+            <a:off x="6972300" y="2909949"/>
+            <a:ext cx="381000" cy="484632"/>
+          </a:xfrm>
+          <a:prstGeom prst="leftArrow">
+            <a:avLst/>
+          </a:prstGeom>
+        </p:spPr>
+        <p:style>
+          <a:lnRef idx="2">
+            <a:schemeClr val="accent1">
+              <a:shade val="50000"/>
+            </a:schemeClr>
+          </a:lnRef>
+          <a:fillRef idx="1">
+            <a:schemeClr val="accent1"/>
+          </a:fillRef>
+          <a:effectRef idx="0">
+            <a:schemeClr val="accent1"/>
+          </a:effectRef>
+          <a:fontRef idx="minor">
+            <a:schemeClr val="lt1"/>
+          </a:fontRef>
+        </p:style>
+        <p:txBody>
+          <a:bodyPr rtlCol="0" anchor="ctr"/>
+          <a:lstStyle/>
+          <a:p>
+            <a:pPr algn="ctr"/>
+            <a:endParaRPr lang="en-US"/>
+          </a:p>
+        </p:txBody>
+      </p:sp>
+      <p:sp>
+        <p:nvSpPr>
+          <p:cNvPr id="32" name="TextBox 31"/>
+          <p:cNvSpPr txBox="1"/>
+          <p:nvPr/>
+        </p:nvSpPr>
+        <p:spPr>
+          <a:xfrm>
+            <a:off x="7391400" y="2819400"/>
+            <a:ext cx="1647310" cy="646331"/>
+          </a:xfrm>
+          <a:prstGeom prst="rect">
+            <a:avLst/>
+          </a:prstGeom>
+          <a:noFill/>
+        </p:spPr>
+        <p:txBody>
+          <a:bodyPr wrap="none" rtlCol="0">
+            <a:spAutoFit/>
+          </a:bodyPr>
+          <a:lstStyle/>
+          <a:p>
+            <a:r>
+              <a:rPr lang="en-US" dirty="0" smtClean="0"/>
+              <a:t>Heaney results</a:t>
+            </a:r>
+          </a:p>
+          <a:p>
+            <a:r>
+              <a:rPr lang="en-US" dirty="0" smtClean="0"/>
+              <a:t>at 206 Hz</a:t>
+            </a:r>
+            <a:endParaRPr lang="en-US" dirty="0"/>
+          </a:p>
+        </p:txBody>
+      </p:sp>
+      <p:cxnSp>
+        <p:nvCxnSpPr>
+          <p:cNvPr id="34" name="Straight Arrow Connector 33"/>
+          <p:cNvCxnSpPr/>
+          <p:nvPr/>
+        </p:nvCxnSpPr>
+        <p:spPr>
+          <a:xfrm flipH="1" flipV="1">
+            <a:off x="3581400" y="5429898"/>
+            <a:ext cx="609600" cy="24077"/>
+          </a:xfrm>
+          <a:prstGeom prst="straightConnector1">
+            <a:avLst/>
+          </a:prstGeom>
+          <a:ln w="38100">
+            <a:solidFill>
+              <a:srgbClr val="FF0000"/>
+            </a:solidFill>
+            <a:tailEnd type="arrow"/>
+          </a:ln>
+        </p:spPr>
+        <p:style>
+          <a:lnRef idx="1">
+            <a:schemeClr val="accent1"/>
+          </a:lnRef>
+          <a:fillRef idx="0">
+            <a:schemeClr val="accent1"/>
+          </a:fillRef>
+          <a:effectRef idx="0">
+            <a:schemeClr val="accent1"/>
+          </a:effectRef>
+          <a:fontRef idx="minor">
+            <a:schemeClr val="tx1"/>
+          </a:fontRef>
+        </p:style>
+      </p:cxnSp>
+      <p:sp>
+        <p:nvSpPr>
+          <p:cNvPr id="35" name="TextBox 34"/>
+          <p:cNvSpPr txBox="1"/>
+          <p:nvPr/>
+        </p:nvSpPr>
+        <p:spPr>
+          <a:xfrm>
+            <a:off x="4191000" y="5293301"/>
+            <a:ext cx="1192634" cy="369332"/>
+          </a:xfrm>
+          <a:prstGeom prst="rect">
+            <a:avLst/>
+          </a:prstGeom>
+          <a:noFill/>
+        </p:spPr>
+        <p:txBody>
+          <a:bodyPr wrap="none" rtlCol="0">
+            <a:spAutoFit/>
+          </a:bodyPr>
+          <a:lstStyle/>
+          <a:p>
+            <a:r>
+              <a:rPr lang="en-US" dirty="0" smtClean="0">
+                <a:solidFill>
+                  <a:srgbClr val="FF0000"/>
+                </a:solidFill>
+              </a:rPr>
+              <a:t>WaveQ3D</a:t>
+            </a:r>
+            <a:endParaRPr lang="en-US" dirty="0">
+              <a:solidFill>
+                <a:srgbClr val="FF0000"/>
+              </a:solidFill>
+            </a:endParaRPr>
+          </a:p>
+        </p:txBody>
+      </p:sp>
+      <p:sp>
+        <p:nvSpPr>
+          <p:cNvPr id="36" name="TextBox 35"/>
+          <p:cNvSpPr txBox="1"/>
+          <p:nvPr/>
+        </p:nvSpPr>
+        <p:spPr>
+          <a:xfrm>
+            <a:off x="1529951" y="6477000"/>
+            <a:ext cx="5620769" cy="369332"/>
+          </a:xfrm>
+          <a:prstGeom prst="rect">
+            <a:avLst/>
+          </a:prstGeom>
+          <a:noFill/>
+        </p:spPr>
+        <p:txBody>
+          <a:bodyPr wrap="none" rtlCol="0">
+            <a:spAutoFit/>
+          </a:bodyPr>
+          <a:lstStyle/>
+          <a:p>
+            <a:r>
+              <a:rPr lang="en-US" dirty="0" smtClean="0">
+                <a:solidFill>
+                  <a:srgbClr val="FF0000"/>
+                </a:solidFill>
+              </a:rPr>
+              <a:t>WaveQ3D fails </a:t>
+            </a:r>
+            <a:r>
+              <a:rPr lang="en-US" dirty="0">
+                <a:solidFill>
+                  <a:srgbClr val="FF0000"/>
+                </a:solidFill>
+              </a:rPr>
+              <a:t>to detect eigenrays for the inshore </a:t>
+            </a:r>
+            <a:r>
+              <a:rPr lang="en-US" dirty="0" smtClean="0">
+                <a:solidFill>
+                  <a:srgbClr val="FF0000"/>
+                </a:solidFill>
+              </a:rPr>
+              <a:t>path!</a:t>
+            </a:r>
+            <a:endParaRPr lang="en-US" dirty="0">
+              <a:solidFill>
+                <a:srgbClr val="FF0000"/>
+              </a:solidFill>
+            </a:endParaRPr>
+          </a:p>
+        </p:txBody>
+      </p:sp>
+    </p:spTree>
+    <p:extLst>
+      <p:ext uri="{BB962C8B-B14F-4D97-AF65-F5344CB8AC3E}">
+        <p14:creationId xmlns:p14="http://schemas.microsoft.com/office/powerpoint/2010/main" val="2051860329"/>
+      </p:ext>
+    </p:extLst>
+  </p:cSld>
+  <p:clrMapOvr>
+    <a:masterClrMapping/>
+  </p:clrMapOvr>
+  <p:timing>
+    <p:tnLst>
+      <p:par>
+        <p:cTn id="1" dur="indefinite" restart="never" nodeType="tmRoot"/>
+      </p:par>
+    </p:tnLst>
+  </p:timing>
+</p:sld>
+</file>
+
+<file path=ppt/slides/slide9.xml><?xml version="1.0" encoding="utf-8"?>
+<p:sld xmlns:a="http://schemas.openxmlformats.org/drawingml/2006/main" xmlns:r="http://schemas.openxmlformats.org/officeDocument/2006/relationships" xmlns:p="http://schemas.openxmlformats.org/presentationml/2006/main" show="0">
+  <p:cSld>
+    <p:spTree>
+      <p:nvGrpSpPr>
+        <p:cNvPr id="1" name=""/>
+        <p:cNvGrpSpPr/>
+        <p:nvPr/>
+      </p:nvGrpSpPr>
+      <p:grpSpPr>
+        <a:xfrm>
+          <a:off x="0" y="0"/>
+          <a:ext cx="0" cy="0"/>
+          <a:chOff x="0" y="0"/>
+          <a:chExt cx="0" cy="0"/>
+        </a:xfrm>
+      </p:grpSpPr>
+      <p:sp>
+        <p:nvSpPr>
+          <p:cNvPr id="2" name="Title 1"/>
+          <p:cNvSpPr>
+            <a:spLocks noGrp="1"/>
+          </p:cNvSpPr>
+          <p:nvPr>
+            <p:ph type="title"/>
+          </p:nvPr>
+        </p:nvSpPr>
+        <p:spPr/>
+        <p:txBody>
+          <a:bodyPr/>
+          <a:lstStyle/>
+          <a:p>
+            <a:r>
+              <a:rPr lang="en-US" dirty="0"/>
+              <a:t>Transmission </a:t>
+            </a:r>
+            <a:r>
+              <a:rPr lang="en-US" dirty="0" smtClean="0"/>
+              <a:t>Loss </a:t>
+            </a:r>
+            <a:r>
+              <a:rPr lang="en-US" dirty="0"/>
+              <a:t>Observations</a:t>
+            </a:r>
+          </a:p>
+        </p:txBody>
+      </p:sp>
+      <p:sp>
+        <p:nvSpPr>
+          <p:cNvPr id="3" name="Content Placeholder 2"/>
+          <p:cNvSpPr>
+            <a:spLocks noGrp="1"/>
+          </p:cNvSpPr>
+          <p:nvPr>
+            <p:ph idx="1"/>
+          </p:nvPr>
+        </p:nvSpPr>
+        <p:spPr/>
+        <p:txBody>
+          <a:bodyPr/>
+          <a:lstStyle/>
+          <a:p>
+            <a:r>
+              <a:rPr lang="en-US" dirty="0" smtClean="0"/>
+              <a:t>WaveQ3D fails to detect eigenrays for the inshore path.</a:t>
+            </a:r>
+          </a:p>
+          <a:p>
+            <a:r>
+              <a:rPr lang="en-US" dirty="0" smtClean="0"/>
+              <a:t>As the number of bottom interactions increases</a:t>
+            </a:r>
+          </a:p>
+          <a:p>
+            <a:pPr lvl="1"/>
+            <a:r>
+              <a:rPr lang="en-US" dirty="0" smtClean="0"/>
+              <a:t>Difficult to find any neighbors with the same # of bounces. </a:t>
+            </a:r>
+            <a:r>
+              <a:rPr lang="en-US" dirty="0" smtClean="0">
+                <a:sym typeface="Wingdings"/>
+              </a:rPr>
+              <a:t> shortcoming of hybrid beam approach</a:t>
+            </a:r>
+          </a:p>
+          <a:p>
+            <a:r>
+              <a:rPr lang="en-US" dirty="0" smtClean="0">
+                <a:sym typeface="Wingdings"/>
+              </a:rPr>
+              <a:t>This problem must be resolved before WaveQ3D can be validated.</a:t>
+            </a:r>
+            <a:endParaRPr lang="en-US" dirty="0"/>
+          </a:p>
+        </p:txBody>
+      </p:sp>
+      <p:sp>
+        <p:nvSpPr>
+          <p:cNvPr id="4" name="Slide Number Placeholder 3"/>
+          <p:cNvSpPr>
+            <a:spLocks noGrp="1"/>
+          </p:cNvSpPr>
+          <p:nvPr>
+            <p:ph type="sldNum" sz="quarter" idx="12"/>
+          </p:nvPr>
+        </p:nvSpPr>
+        <p:spPr/>
+        <p:txBody>
+          <a:bodyPr/>
+          <a:lstStyle/>
+          <a:p>
+            <a:fld id="{719B5E6B-B750-449F-A404-1846F1BF9B87}" type="slidenum">
+              <a:rPr lang="en-US" smtClean="0"/>
+              <a:pPr/>
+              <a:t>9</a:t>
+            </a:fld>
+            <a:endParaRPr lang="en-US"/>
+          </a:p>
+        </p:txBody>
+      </p:sp>
+    </p:spTree>
+    <p:extLst>
+      <p:ext uri="{BB962C8B-B14F-4D97-AF65-F5344CB8AC3E}">
+        <p14:creationId xmlns:p14="http://schemas.microsoft.com/office/powerpoint/2010/main" val="1477429629"/>
+      </p:ext>
+    </p:extLst>
+  </p:cSld>
+  <p:clrMapOvr>
+    <a:masterClrMapping/>
+  </p:clrMapOvr>
+  <mc:AlternateContent xmlns:mc="http://schemas.openxmlformats.org/markup-compatibility/2006">
+    <mc:Choice xmlns:p14="http://schemas.microsoft.com/office/powerpoint/2010/main" Requires="p14">
+      <p:transition spd="slow" p14:dur="2000"/>
+    </mc:Choice>
+    <mc:Fallback>
+      <p:transition spd="slow"/>
+    </mc:Fallback>
+  </mc:AlternateContent>
   <p:timing>
     <p:tnLst>
       <p:par>

</xml_diff>